<commit_message>
updated summary of results so far
</commit_message>
<xml_diff>
--- a/nkiRockland/phenotypic/NKI_ongoing_thought/results/results_so_far.pptx
+++ b/nkiRockland/phenotypic/NKI_ongoing_thought/results/results_so_far.pptx
@@ -5,8 +5,18 @@
     <p:sldMasterId id="2147483648" r:id="rId1"/>
   </p:sldMasterIdLst>
   <p:sldIdLst>
-    <p:sldId id="256" r:id="rId2"/>
-    <p:sldId id="257" r:id="rId3"/>
+    <p:sldId id="263" r:id="rId2"/>
+    <p:sldId id="256" r:id="rId3"/>
+    <p:sldId id="264" r:id="rId4"/>
+    <p:sldId id="257" r:id="rId5"/>
+    <p:sldId id="265" r:id="rId6"/>
+    <p:sldId id="258" r:id="rId7"/>
+    <p:sldId id="266" r:id="rId8"/>
+    <p:sldId id="259" r:id="rId9"/>
+    <p:sldId id="267" r:id="rId10"/>
+    <p:sldId id="260" r:id="rId11"/>
+    <p:sldId id="268" r:id="rId12"/>
+    <p:sldId id="261" r:id="rId13"/>
   </p:sldIdLst>
   <p:sldSz cx="12192000" cy="6858000"/>
   <p:notesSz cx="6858000" cy="9144000"/>
@@ -105,12 +115,17 @@
       </a:defRPr>
     </a:lvl9pPr>
   </p:defaultTextStyle>
+  <p:extLst>
+    <p:ext uri="{EFAFB233-063F-42B5-8137-9DF3F51BA10A}">
+      <p15:sldGuideLst xmlns:p15="http://schemas.microsoft.com/office/powerpoint/2012/main"/>
+    </p:ext>
+  </p:extLst>
 </p:presentation>
 </file>
 
 <file path=ppt/commentAuthors.xml><?xml version="1.0" encoding="utf-8"?>
 <p:cmAuthorLst xmlns:a="http://schemas.openxmlformats.org/drawingml/2006/main" xmlns:r="http://schemas.openxmlformats.org/officeDocument/2006/relationships" xmlns:p="http://schemas.openxmlformats.org/presentationml/2006/main">
-  <p:cmAuthor id="1" name="Turnbull, Adam" initials="TA" lastIdx="1" clrIdx="0">
+  <p:cmAuthor id="1" name="Turnbull, Adam" initials="TA" lastIdx="9" clrIdx="0">
     <p:extLst>
       <p:ext uri="{19B8F6BF-5375-455C-9EA6-DF929625EA0E}">
         <p15:presenceInfo xmlns:p15="http://schemas.microsoft.com/office/powerpoint/2012/main" userId="S::adam_turnbull@urmc.rochester.edu::044b1674-8058-41d2-89a9-09c45dcb3fd4" providerId="AD"/>
@@ -267,7 +282,7 @@
           <a:p>
             <a:fld id="{25FF0A44-147E-3441-A53D-816E14540497}" type="datetimeFigureOut">
               <a:rPr lang="en-US" smtClean="0"/>
-              <a:t>7/14/20</a:t>
+              <a:t>7/20/20</a:t>
             </a:fld>
             <a:endParaRPr lang="en-US"/>
           </a:p>
@@ -465,7 +480,7 @@
           <a:p>
             <a:fld id="{25FF0A44-147E-3441-A53D-816E14540497}" type="datetimeFigureOut">
               <a:rPr lang="en-US" smtClean="0"/>
-              <a:t>7/14/20</a:t>
+              <a:t>7/20/20</a:t>
             </a:fld>
             <a:endParaRPr lang="en-US"/>
           </a:p>
@@ -673,7 +688,7 @@
           <a:p>
             <a:fld id="{25FF0A44-147E-3441-A53D-816E14540497}" type="datetimeFigureOut">
               <a:rPr lang="en-US" smtClean="0"/>
-              <a:t>7/14/20</a:t>
+              <a:t>7/20/20</a:t>
             </a:fld>
             <a:endParaRPr lang="en-US"/>
           </a:p>
@@ -871,7 +886,7 @@
           <a:p>
             <a:fld id="{25FF0A44-147E-3441-A53D-816E14540497}" type="datetimeFigureOut">
               <a:rPr lang="en-US" smtClean="0"/>
-              <a:t>7/14/20</a:t>
+              <a:t>7/20/20</a:t>
             </a:fld>
             <a:endParaRPr lang="en-US"/>
           </a:p>
@@ -1146,7 +1161,7 @@
           <a:p>
             <a:fld id="{25FF0A44-147E-3441-A53D-816E14540497}" type="datetimeFigureOut">
               <a:rPr lang="en-US" smtClean="0"/>
-              <a:t>7/14/20</a:t>
+              <a:t>7/20/20</a:t>
             </a:fld>
             <a:endParaRPr lang="en-US"/>
           </a:p>
@@ -1411,7 +1426,7 @@
           <a:p>
             <a:fld id="{25FF0A44-147E-3441-A53D-816E14540497}" type="datetimeFigureOut">
               <a:rPr lang="en-US" smtClean="0"/>
-              <a:t>7/14/20</a:t>
+              <a:t>7/20/20</a:t>
             </a:fld>
             <a:endParaRPr lang="en-US"/>
           </a:p>
@@ -1823,7 +1838,7 @@
           <a:p>
             <a:fld id="{25FF0A44-147E-3441-A53D-816E14540497}" type="datetimeFigureOut">
               <a:rPr lang="en-US" smtClean="0"/>
-              <a:t>7/14/20</a:t>
+              <a:t>7/20/20</a:t>
             </a:fld>
             <a:endParaRPr lang="en-US"/>
           </a:p>
@@ -1964,7 +1979,7 @@
           <a:p>
             <a:fld id="{25FF0A44-147E-3441-A53D-816E14540497}" type="datetimeFigureOut">
               <a:rPr lang="en-US" smtClean="0"/>
-              <a:t>7/14/20</a:t>
+              <a:t>7/20/20</a:t>
             </a:fld>
             <a:endParaRPr lang="en-US"/>
           </a:p>
@@ -2077,7 +2092,7 @@
           <a:p>
             <a:fld id="{25FF0A44-147E-3441-A53D-816E14540497}" type="datetimeFigureOut">
               <a:rPr lang="en-US" smtClean="0"/>
-              <a:t>7/14/20</a:t>
+              <a:t>7/20/20</a:t>
             </a:fld>
             <a:endParaRPr lang="en-US"/>
           </a:p>
@@ -2388,7 +2403,7 @@
           <a:p>
             <a:fld id="{25FF0A44-147E-3441-A53D-816E14540497}" type="datetimeFigureOut">
               <a:rPr lang="en-US" smtClean="0"/>
-              <a:t>7/14/20</a:t>
+              <a:t>7/20/20</a:t>
             </a:fld>
             <a:endParaRPr lang="en-US"/>
           </a:p>
@@ -2676,7 +2691,7 @@
           <a:p>
             <a:fld id="{25FF0A44-147E-3441-A53D-816E14540497}" type="datetimeFigureOut">
               <a:rPr lang="en-US" smtClean="0"/>
-              <a:t>7/14/20</a:t>
+              <a:t>7/20/20</a:t>
             </a:fld>
             <a:endParaRPr lang="en-US"/>
           </a:p>
@@ -2917,7 +2932,7 @@
           <a:p>
             <a:fld id="{25FF0A44-147E-3441-A53D-816E14540497}" type="datetimeFigureOut">
               <a:rPr lang="en-US" smtClean="0"/>
-              <a:t>7/14/20</a:t>
+              <a:t>7/20/20</a:t>
             </a:fld>
             <a:endParaRPr lang="en-US"/>
           </a:p>
@@ -3334,6 +3349,340 @@
           <a:chExt cx="0" cy="0"/>
         </a:xfrm>
       </p:grpSpPr>
+      <p:sp>
+        <p:nvSpPr>
+          <p:cNvPr id="2" name="Title 1">
+            <a:extLst>
+              <a:ext uri="{FF2B5EF4-FFF2-40B4-BE49-F238E27FC236}">
+                <a16:creationId xmlns:a16="http://schemas.microsoft.com/office/drawing/2014/main" id="{ACB1C92E-B525-BA41-BA5C-91FE0CB6D073}"/>
+              </a:ext>
+            </a:extLst>
+          </p:cNvPr>
+          <p:cNvSpPr>
+            <a:spLocks noGrp="1"/>
+          </p:cNvSpPr>
+          <p:nvPr>
+            <p:ph type="title"/>
+          </p:nvPr>
+        </p:nvSpPr>
+        <p:spPr/>
+        <p:txBody>
+          <a:bodyPr/>
+          <a:lstStyle/>
+          <a:p>
+            <a:r>
+              <a:rPr lang="en-US" dirty="0"/>
+              <a:t>Step 1: PCA on NYC-Q</a:t>
+            </a:r>
+          </a:p>
+        </p:txBody>
+      </p:sp>
+      <p:sp>
+        <p:nvSpPr>
+          <p:cNvPr id="3" name="Content Placeholder 2">
+            <a:extLst>
+              <a:ext uri="{FF2B5EF4-FFF2-40B4-BE49-F238E27FC236}">
+                <a16:creationId xmlns:a16="http://schemas.microsoft.com/office/drawing/2014/main" id="{A0EBEAD0-C28E-E548-9A09-B0617C6BF11B}"/>
+              </a:ext>
+            </a:extLst>
+          </p:cNvPr>
+          <p:cNvSpPr>
+            <a:spLocks noGrp="1"/>
+          </p:cNvSpPr>
+          <p:nvPr>
+            <p:ph idx="1"/>
+          </p:nvPr>
+        </p:nvSpPr>
+        <p:spPr/>
+        <p:txBody>
+          <a:bodyPr/>
+          <a:lstStyle/>
+          <a:p>
+            <a:r>
+              <a:rPr lang="en-US" dirty="0"/>
+              <a:t>Ran a PCA on the NYC-Q (n=643) to understand different components of thought that it measures</a:t>
+            </a:r>
+          </a:p>
+          <a:p>
+            <a:r>
+              <a:rPr lang="en-US" dirty="0"/>
+              <a:t>Ended up with 7 components</a:t>
+            </a:r>
+          </a:p>
+        </p:txBody>
+      </p:sp>
+    </p:spTree>
+    <p:extLst>
+      <p:ext uri="{BB962C8B-B14F-4D97-AF65-F5344CB8AC3E}">
+        <p14:creationId xmlns:p14="http://schemas.microsoft.com/office/powerpoint/2010/main" val="2526125438"/>
+      </p:ext>
+    </p:extLst>
+  </p:cSld>
+  <p:clrMapOvr>
+    <a:masterClrMapping/>
+  </p:clrMapOvr>
+</p:sld>
+</file>
+
+<file path=ppt/slides/slide10.xml><?xml version="1.0" encoding="utf-8"?>
+<p:sld xmlns:a="http://schemas.openxmlformats.org/drawingml/2006/main" xmlns:r="http://schemas.openxmlformats.org/officeDocument/2006/relationships" xmlns:p="http://schemas.openxmlformats.org/presentationml/2006/main">
+  <p:cSld>
+    <p:spTree>
+      <p:nvGrpSpPr>
+        <p:cNvPr id="1" name=""/>
+        <p:cNvGrpSpPr/>
+        <p:nvPr/>
+      </p:nvGrpSpPr>
+      <p:grpSpPr>
+        <a:xfrm>
+          <a:off x="0" y="0"/>
+          <a:ext cx="0" cy="0"/>
+          <a:chOff x="0" y="0"/>
+          <a:chExt cx="0" cy="0"/>
+        </a:xfrm>
+      </p:grpSpPr>
+      <p:pic>
+        <p:nvPicPr>
+          <p:cNvPr id="5" name="Picture 4" descr="A screenshot of a cell phone&#10;&#10;Description automatically generated">
+            <a:extLst>
+              <a:ext uri="{FF2B5EF4-FFF2-40B4-BE49-F238E27FC236}">
+                <a16:creationId xmlns:a16="http://schemas.microsoft.com/office/drawing/2014/main" id="{64FEA7C3-010F-6D49-9FC8-336CE975E88C}"/>
+              </a:ext>
+            </a:extLst>
+          </p:cNvPr>
+          <p:cNvPicPr>
+            <a:picLocks noChangeAspect="1"/>
+          </p:cNvPicPr>
+          <p:nvPr/>
+        </p:nvPicPr>
+        <p:blipFill>
+          <a:blip r:embed="rId2"/>
+          <a:stretch>
+            <a:fillRect/>
+          </a:stretch>
+        </p:blipFill>
+        <p:spPr>
+          <a:xfrm>
+            <a:off x="528638" y="242887"/>
+            <a:ext cx="10701338" cy="1564818"/>
+          </a:xfrm>
+          <a:prstGeom prst="rect">
+            <a:avLst/>
+          </a:prstGeom>
+        </p:spPr>
+      </p:pic>
+      <p:pic>
+        <p:nvPicPr>
+          <p:cNvPr id="9" name="Picture 8" descr="A screenshot of a cell phone&#10;&#10;Description automatically generated">
+            <a:extLst>
+              <a:ext uri="{FF2B5EF4-FFF2-40B4-BE49-F238E27FC236}">
+                <a16:creationId xmlns:a16="http://schemas.microsoft.com/office/drawing/2014/main" id="{9ACE5CE6-233C-2B45-94D0-5B6E61C15A71}"/>
+              </a:ext>
+            </a:extLst>
+          </p:cNvPr>
+          <p:cNvPicPr>
+            <a:picLocks noChangeAspect="1"/>
+          </p:cNvPicPr>
+          <p:nvPr/>
+        </p:nvPicPr>
+        <p:blipFill>
+          <a:blip r:embed="rId3"/>
+          <a:stretch>
+            <a:fillRect/>
+          </a:stretch>
+        </p:blipFill>
+        <p:spPr>
+          <a:xfrm>
+            <a:off x="528638" y="2307767"/>
+            <a:ext cx="10772728" cy="3792995"/>
+          </a:xfrm>
+          <a:prstGeom prst="rect">
+            <a:avLst/>
+          </a:prstGeom>
+        </p:spPr>
+      </p:pic>
+    </p:spTree>
+    <p:extLst>
+      <p:ext uri="{BB962C8B-B14F-4D97-AF65-F5344CB8AC3E}">
+        <p14:creationId xmlns:p14="http://schemas.microsoft.com/office/powerpoint/2010/main" val="1828392742"/>
+      </p:ext>
+    </p:extLst>
+  </p:cSld>
+  <p:clrMapOvr>
+    <a:masterClrMapping/>
+  </p:clrMapOvr>
+</p:sld>
+</file>
+
+<file path=ppt/slides/slide11.xml><?xml version="1.0" encoding="utf-8"?>
+<p:sld xmlns:a="http://schemas.openxmlformats.org/drawingml/2006/main" xmlns:r="http://schemas.openxmlformats.org/officeDocument/2006/relationships" xmlns:p="http://schemas.openxmlformats.org/presentationml/2006/main">
+  <p:cSld>
+    <p:spTree>
+      <p:nvGrpSpPr>
+        <p:cNvPr id="1" name=""/>
+        <p:cNvGrpSpPr/>
+        <p:nvPr/>
+      </p:nvGrpSpPr>
+      <p:grpSpPr>
+        <a:xfrm>
+          <a:off x="0" y="0"/>
+          <a:ext cx="0" cy="0"/>
+          <a:chOff x="0" y="0"/>
+          <a:chExt cx="0" cy="0"/>
+        </a:xfrm>
+      </p:grpSpPr>
+      <p:sp>
+        <p:nvSpPr>
+          <p:cNvPr id="2" name="Title 1">
+            <a:extLst>
+              <a:ext uri="{FF2B5EF4-FFF2-40B4-BE49-F238E27FC236}">
+                <a16:creationId xmlns:a16="http://schemas.microsoft.com/office/drawing/2014/main" id="{3849E5B2-EC9D-C84B-B07C-D45B304C79C0}"/>
+              </a:ext>
+            </a:extLst>
+          </p:cNvPr>
+          <p:cNvSpPr>
+            <a:spLocks noGrp="1"/>
+          </p:cNvSpPr>
+          <p:nvPr>
+            <p:ph type="title"/>
+          </p:nvPr>
+        </p:nvSpPr>
+        <p:spPr/>
+        <p:txBody>
+          <a:bodyPr/>
+          <a:lstStyle/>
+          <a:p>
+            <a:r>
+              <a:rPr lang="en-US" dirty="0"/>
+              <a:t>Noticed: age no longer significant</a:t>
+            </a:r>
+          </a:p>
+        </p:txBody>
+      </p:sp>
+      <p:sp>
+        <p:nvSpPr>
+          <p:cNvPr id="3" name="Content Placeholder 2">
+            <a:extLst>
+              <a:ext uri="{FF2B5EF4-FFF2-40B4-BE49-F238E27FC236}">
+                <a16:creationId xmlns:a16="http://schemas.microsoft.com/office/drawing/2014/main" id="{371601AC-8E76-DA48-9FA3-294F6953F4F9}"/>
+              </a:ext>
+            </a:extLst>
+          </p:cNvPr>
+          <p:cNvSpPr>
+            <a:spLocks noGrp="1"/>
+          </p:cNvSpPr>
+          <p:nvPr>
+            <p:ph idx="1"/>
+          </p:nvPr>
+        </p:nvSpPr>
+        <p:spPr/>
+        <p:txBody>
+          <a:bodyPr/>
+          <a:lstStyle/>
+          <a:p>
+            <a:r>
+              <a:rPr lang="en-US" dirty="0"/>
+              <a:t>In this model, age no longer related to component 7 (thinking in images)</a:t>
+            </a:r>
+          </a:p>
+          <a:p>
+            <a:r>
+              <a:rPr lang="en-US" dirty="0"/>
+              <a:t>Potential mediation by EF</a:t>
+            </a:r>
+          </a:p>
+        </p:txBody>
+      </p:sp>
+    </p:spTree>
+    <p:extLst>
+      <p:ext uri="{BB962C8B-B14F-4D97-AF65-F5344CB8AC3E}">
+        <p14:creationId xmlns:p14="http://schemas.microsoft.com/office/powerpoint/2010/main" val="1873381221"/>
+      </p:ext>
+    </p:extLst>
+  </p:cSld>
+  <p:clrMapOvr>
+    <a:masterClrMapping/>
+  </p:clrMapOvr>
+</p:sld>
+</file>
+
+<file path=ppt/slides/slide12.xml><?xml version="1.0" encoding="utf-8"?>
+<p:sld xmlns:a="http://schemas.openxmlformats.org/drawingml/2006/main" xmlns:r="http://schemas.openxmlformats.org/officeDocument/2006/relationships" xmlns:p="http://schemas.openxmlformats.org/presentationml/2006/main">
+  <p:cSld>
+    <p:spTree>
+      <p:nvGrpSpPr>
+        <p:cNvPr id="1" name=""/>
+        <p:cNvGrpSpPr/>
+        <p:nvPr/>
+      </p:nvGrpSpPr>
+      <p:grpSpPr>
+        <a:xfrm>
+          <a:off x="0" y="0"/>
+          <a:ext cx="0" cy="0"/>
+          <a:chOff x="0" y="0"/>
+          <a:chExt cx="0" cy="0"/>
+        </a:xfrm>
+      </p:grpSpPr>
+      <p:pic>
+        <p:nvPicPr>
+          <p:cNvPr id="5" name="Picture 4" descr="A screenshot of a cell phone&#10;&#10;Description automatically generated">
+            <a:extLst>
+              <a:ext uri="{FF2B5EF4-FFF2-40B4-BE49-F238E27FC236}">
+                <a16:creationId xmlns:a16="http://schemas.microsoft.com/office/drawing/2014/main" id="{64EE728D-7FE3-CD43-BEBB-D6917FA5DD8A}"/>
+              </a:ext>
+            </a:extLst>
+          </p:cNvPr>
+          <p:cNvPicPr>
+            <a:picLocks noChangeAspect="1"/>
+          </p:cNvPicPr>
+          <p:nvPr/>
+        </p:nvPicPr>
+        <p:blipFill>
+          <a:blip r:embed="rId2"/>
+          <a:stretch>
+            <a:fillRect/>
+          </a:stretch>
+        </p:blipFill>
+        <p:spPr>
+          <a:xfrm>
+            <a:off x="421175" y="1436687"/>
+            <a:ext cx="11349649" cy="3984625"/>
+          </a:xfrm>
+          <a:prstGeom prst="rect">
+            <a:avLst/>
+          </a:prstGeom>
+        </p:spPr>
+      </p:pic>
+    </p:spTree>
+    <p:extLst>
+      <p:ext uri="{BB962C8B-B14F-4D97-AF65-F5344CB8AC3E}">
+        <p14:creationId xmlns:p14="http://schemas.microsoft.com/office/powerpoint/2010/main" val="3460276502"/>
+      </p:ext>
+    </p:extLst>
+  </p:cSld>
+  <p:clrMapOvr>
+    <a:masterClrMapping/>
+  </p:clrMapOvr>
+</p:sld>
+</file>
+
+<file path=ppt/slides/slide2.xml><?xml version="1.0" encoding="utf-8"?>
+<p:sld xmlns:a="http://schemas.openxmlformats.org/drawingml/2006/main" xmlns:r="http://schemas.openxmlformats.org/officeDocument/2006/relationships" xmlns:p="http://schemas.openxmlformats.org/presentationml/2006/main">
+  <p:cSld>
+    <p:spTree>
+      <p:nvGrpSpPr>
+        <p:cNvPr id="1" name=""/>
+        <p:cNvGrpSpPr/>
+        <p:nvPr/>
+      </p:nvGrpSpPr>
+      <p:grpSpPr>
+        <a:xfrm>
+          <a:off x="0" y="0"/>
+          <a:ext cx="0" cy="0"/>
+          <a:chOff x="0" y="0"/>
+          <a:chExt cx="0" cy="0"/>
+        </a:xfrm>
+      </p:grpSpPr>
       <p:pic>
         <p:nvPicPr>
           <p:cNvPr id="5" name="Picture 4" descr="A screenshot of a cell phone&#10;&#10;Description automatically generated">
@@ -3377,7 +3726,128 @@
 </p:sld>
 </file>
 
-<file path=ppt/slides/slide2.xml><?xml version="1.0" encoding="utf-8"?>
+<file path=ppt/slides/slide3.xml><?xml version="1.0" encoding="utf-8"?>
+<p:sld xmlns:a="http://schemas.openxmlformats.org/drawingml/2006/main" xmlns:r="http://schemas.openxmlformats.org/officeDocument/2006/relationships" xmlns:p="http://schemas.openxmlformats.org/presentationml/2006/main">
+  <p:cSld>
+    <p:spTree>
+      <p:nvGrpSpPr>
+        <p:cNvPr id="1" name=""/>
+        <p:cNvGrpSpPr/>
+        <p:nvPr/>
+      </p:nvGrpSpPr>
+      <p:grpSpPr>
+        <a:xfrm>
+          <a:off x="0" y="0"/>
+          <a:ext cx="0" cy="0"/>
+          <a:chOff x="0" y="0"/>
+          <a:chExt cx="0" cy="0"/>
+        </a:xfrm>
+      </p:grpSpPr>
+      <p:sp>
+        <p:nvSpPr>
+          <p:cNvPr id="2" name="Title 1">
+            <a:extLst>
+              <a:ext uri="{FF2B5EF4-FFF2-40B4-BE49-F238E27FC236}">
+                <a16:creationId xmlns:a16="http://schemas.microsoft.com/office/drawing/2014/main" id="{D9CF94B7-8755-F54D-A6A5-DB59F5D2FA0E}"/>
+              </a:ext>
+            </a:extLst>
+          </p:cNvPr>
+          <p:cNvSpPr>
+            <a:spLocks noGrp="1"/>
+          </p:cNvSpPr>
+          <p:nvPr>
+            <p:ph type="title"/>
+          </p:nvPr>
+        </p:nvSpPr>
+        <p:spPr/>
+        <p:txBody>
+          <a:bodyPr/>
+          <a:lstStyle/>
+          <a:p>
+            <a:r>
+              <a:rPr lang="en-US" dirty="0"/>
+              <a:t>Step 2: t-tests between old and young adults</a:t>
+            </a:r>
+          </a:p>
+        </p:txBody>
+      </p:sp>
+      <p:sp>
+        <p:nvSpPr>
+          <p:cNvPr id="3" name="Content Placeholder 2">
+            <a:extLst>
+              <a:ext uri="{FF2B5EF4-FFF2-40B4-BE49-F238E27FC236}">
+                <a16:creationId xmlns:a16="http://schemas.microsoft.com/office/drawing/2014/main" id="{FC9AE29B-44CE-3548-9DCB-B58779518A91}"/>
+              </a:ext>
+            </a:extLst>
+          </p:cNvPr>
+          <p:cNvSpPr>
+            <a:spLocks noGrp="1"/>
+          </p:cNvSpPr>
+          <p:nvPr>
+            <p:ph idx="1"/>
+          </p:nvPr>
+        </p:nvSpPr>
+        <p:spPr/>
+        <p:txBody>
+          <a:bodyPr/>
+          <a:lstStyle/>
+          <a:p>
+            <a:r>
+              <a:rPr lang="en-US" dirty="0"/>
+              <a:t>Ran independent t-tests to understand if the amount to which participants engaged these 7 components differed between old (n=135) and young (n=175) participants</a:t>
+            </a:r>
+          </a:p>
+          <a:p>
+            <a:r>
+              <a:rPr lang="en-US" dirty="0"/>
+              <a:t>Components 1, 4, and 7 were significantly greater in young adults</a:t>
+            </a:r>
+          </a:p>
+          <a:p>
+            <a:pPr lvl="1"/>
+            <a:r>
+              <a:rPr lang="en-US" dirty="0"/>
+              <a:t>Social, episodic thoughts including current concerns</a:t>
+            </a:r>
+          </a:p>
+          <a:p>
+            <a:pPr lvl="1"/>
+            <a:r>
+              <a:rPr lang="en-US" dirty="0"/>
+              <a:t>Thoughts about today (earlier and later)</a:t>
+            </a:r>
+          </a:p>
+          <a:p>
+            <a:pPr lvl="1"/>
+            <a:r>
+              <a:rPr lang="en-US" dirty="0"/>
+              <a:t>Thoughts in images</a:t>
+            </a:r>
+          </a:p>
+          <a:p>
+            <a:pPr lvl="1"/>
+            <a:endParaRPr lang="en-US" dirty="0"/>
+          </a:p>
+          <a:p>
+            <a:pPr lvl="1"/>
+            <a:endParaRPr lang="en-US" dirty="0"/>
+          </a:p>
+        </p:txBody>
+      </p:sp>
+    </p:spTree>
+    <p:extLst>
+      <p:ext uri="{BB962C8B-B14F-4D97-AF65-F5344CB8AC3E}">
+        <p14:creationId xmlns:p14="http://schemas.microsoft.com/office/powerpoint/2010/main" val="1767998681"/>
+      </p:ext>
+    </p:extLst>
+  </p:cSld>
+  <p:clrMapOvr>
+    <a:masterClrMapping/>
+  </p:clrMapOvr>
+</p:sld>
+</file>
+
+<file path=ppt/slides/slide4.xml><?xml version="1.0" encoding="utf-8"?>
 <p:sld xmlns:a="http://schemas.openxmlformats.org/drawingml/2006/main" xmlns:r="http://schemas.openxmlformats.org/officeDocument/2006/relationships" xmlns:p="http://schemas.openxmlformats.org/presentationml/2006/main">
   <p:cSld>
     <p:spTree>
@@ -3673,6 +4143,698 @@
     <p:extLst>
       <p:ext uri="{BB962C8B-B14F-4D97-AF65-F5344CB8AC3E}">
         <p14:creationId xmlns:p14="http://schemas.microsoft.com/office/powerpoint/2010/main" val="988701218"/>
+      </p:ext>
+    </p:extLst>
+  </p:cSld>
+  <p:clrMapOvr>
+    <a:masterClrMapping/>
+  </p:clrMapOvr>
+</p:sld>
+</file>
+
+<file path=ppt/slides/slide5.xml><?xml version="1.0" encoding="utf-8"?>
+<p:sld xmlns:a="http://schemas.openxmlformats.org/drawingml/2006/main" xmlns:r="http://schemas.openxmlformats.org/officeDocument/2006/relationships" xmlns:p="http://schemas.openxmlformats.org/presentationml/2006/main">
+  <p:cSld>
+    <p:spTree>
+      <p:nvGrpSpPr>
+        <p:cNvPr id="1" name=""/>
+        <p:cNvGrpSpPr/>
+        <p:nvPr/>
+      </p:nvGrpSpPr>
+      <p:grpSpPr>
+        <a:xfrm>
+          <a:off x="0" y="0"/>
+          <a:ext cx="0" cy="0"/>
+          <a:chOff x="0" y="0"/>
+          <a:chExt cx="0" cy="0"/>
+        </a:xfrm>
+      </p:grpSpPr>
+      <p:sp>
+        <p:nvSpPr>
+          <p:cNvPr id="2" name="Title 1">
+            <a:extLst>
+              <a:ext uri="{FF2B5EF4-FFF2-40B4-BE49-F238E27FC236}">
+                <a16:creationId xmlns:a16="http://schemas.microsoft.com/office/drawing/2014/main" id="{A814156A-522C-144C-BC3F-606B3B69E8CC}"/>
+              </a:ext>
+            </a:extLst>
+          </p:cNvPr>
+          <p:cNvSpPr>
+            <a:spLocks noGrp="1"/>
+          </p:cNvSpPr>
+          <p:nvPr>
+            <p:ph type="title"/>
+          </p:nvPr>
+        </p:nvSpPr>
+        <p:spPr/>
+        <p:txBody>
+          <a:bodyPr/>
+          <a:lstStyle/>
+          <a:p>
+            <a:r>
+              <a:rPr lang="en-US" dirty="0"/>
+              <a:t>Step 3: PCA on executive functioning battery</a:t>
+            </a:r>
+          </a:p>
+        </p:txBody>
+      </p:sp>
+      <p:sp>
+        <p:nvSpPr>
+          <p:cNvPr id="3" name="Content Placeholder 2">
+            <a:extLst>
+              <a:ext uri="{FF2B5EF4-FFF2-40B4-BE49-F238E27FC236}">
+                <a16:creationId xmlns:a16="http://schemas.microsoft.com/office/drawing/2014/main" id="{A326D5E5-1A78-9942-9800-7D295D40EAFC}"/>
+              </a:ext>
+            </a:extLst>
+          </p:cNvPr>
+          <p:cNvSpPr>
+            <a:spLocks noGrp="1"/>
+          </p:cNvSpPr>
+          <p:nvPr>
+            <p:ph idx="1"/>
+          </p:nvPr>
+        </p:nvSpPr>
+        <p:spPr/>
+        <p:txBody>
+          <a:bodyPr/>
+          <a:lstStyle/>
+          <a:p>
+            <a:r>
+              <a:rPr lang="en-US" dirty="0"/>
+              <a:t>Ran PCA on PENN-CPU executive functioning battery (n=742)</a:t>
+            </a:r>
+          </a:p>
+          <a:p>
+            <a:r>
+              <a:rPr lang="en-US" dirty="0"/>
+              <a:t>Ended up with 3 components</a:t>
+            </a:r>
+          </a:p>
+        </p:txBody>
+      </p:sp>
+    </p:spTree>
+    <p:extLst>
+      <p:ext uri="{BB962C8B-B14F-4D97-AF65-F5344CB8AC3E}">
+        <p14:creationId xmlns:p14="http://schemas.microsoft.com/office/powerpoint/2010/main" val="2233683315"/>
+      </p:ext>
+    </p:extLst>
+  </p:cSld>
+  <p:clrMapOvr>
+    <a:masterClrMapping/>
+  </p:clrMapOvr>
+</p:sld>
+</file>
+
+<file path=ppt/slides/slide6.xml><?xml version="1.0" encoding="utf-8"?>
+<p:sld xmlns:a="http://schemas.openxmlformats.org/drawingml/2006/main" xmlns:r="http://schemas.openxmlformats.org/officeDocument/2006/relationships" xmlns:p="http://schemas.openxmlformats.org/presentationml/2006/main">
+  <p:cSld>
+    <p:spTree>
+      <p:nvGrpSpPr>
+        <p:cNvPr id="1" name=""/>
+        <p:cNvGrpSpPr/>
+        <p:nvPr/>
+      </p:nvGrpSpPr>
+      <p:grpSpPr>
+        <a:xfrm>
+          <a:off x="0" y="0"/>
+          <a:ext cx="0" cy="0"/>
+          <a:chOff x="0" y="0"/>
+          <a:chExt cx="0" cy="0"/>
+        </a:xfrm>
+      </p:grpSpPr>
+      <p:pic>
+        <p:nvPicPr>
+          <p:cNvPr id="5" name="Picture 4" descr="A screenshot of a cell phone&#10;&#10;Description automatically generated">
+            <a:extLst>
+              <a:ext uri="{FF2B5EF4-FFF2-40B4-BE49-F238E27FC236}">
+                <a16:creationId xmlns:a16="http://schemas.microsoft.com/office/drawing/2014/main" id="{2B52E3BB-E6C9-E44E-9B20-A4B78EE73B29}"/>
+              </a:ext>
+            </a:extLst>
+          </p:cNvPr>
+          <p:cNvPicPr>
+            <a:picLocks noChangeAspect="1"/>
+          </p:cNvPicPr>
+          <p:nvPr/>
+        </p:nvPicPr>
+        <p:blipFill>
+          <a:blip r:embed="rId2"/>
+          <a:stretch>
+            <a:fillRect/>
+          </a:stretch>
+        </p:blipFill>
+        <p:spPr>
+          <a:xfrm>
+            <a:off x="628258" y="1500981"/>
+            <a:ext cx="10935483" cy="3856038"/>
+          </a:xfrm>
+          <a:prstGeom prst="rect">
+            <a:avLst/>
+          </a:prstGeom>
+        </p:spPr>
+      </p:pic>
+    </p:spTree>
+    <p:extLst>
+      <p:ext uri="{BB962C8B-B14F-4D97-AF65-F5344CB8AC3E}">
+        <p14:creationId xmlns:p14="http://schemas.microsoft.com/office/powerpoint/2010/main" val="2770865495"/>
+      </p:ext>
+    </p:extLst>
+  </p:cSld>
+  <p:clrMapOvr>
+    <a:masterClrMapping/>
+  </p:clrMapOvr>
+</p:sld>
+</file>
+
+<file path=ppt/slides/slide7.xml><?xml version="1.0" encoding="utf-8"?>
+<p:sld xmlns:a="http://schemas.openxmlformats.org/drawingml/2006/main" xmlns:r="http://schemas.openxmlformats.org/officeDocument/2006/relationships" xmlns:p="http://schemas.openxmlformats.org/presentationml/2006/main">
+  <p:cSld>
+    <p:spTree>
+      <p:nvGrpSpPr>
+        <p:cNvPr id="1" name=""/>
+        <p:cNvGrpSpPr/>
+        <p:nvPr/>
+      </p:nvGrpSpPr>
+      <p:grpSpPr>
+        <a:xfrm>
+          <a:off x="0" y="0"/>
+          <a:ext cx="0" cy="0"/>
+          <a:chOff x="0" y="0"/>
+          <a:chExt cx="0" cy="0"/>
+        </a:xfrm>
+      </p:grpSpPr>
+      <p:sp>
+        <p:nvSpPr>
+          <p:cNvPr id="2" name="Title 1">
+            <a:extLst>
+              <a:ext uri="{FF2B5EF4-FFF2-40B4-BE49-F238E27FC236}">
+                <a16:creationId xmlns:a16="http://schemas.microsoft.com/office/drawing/2014/main" id="{4891F36C-9926-0A47-8EA9-2E14D4310473}"/>
+              </a:ext>
+            </a:extLst>
+          </p:cNvPr>
+          <p:cNvSpPr>
+            <a:spLocks noGrp="1"/>
+          </p:cNvSpPr>
+          <p:nvPr>
+            <p:ph type="title"/>
+          </p:nvPr>
+        </p:nvSpPr>
+        <p:spPr/>
+        <p:txBody>
+          <a:bodyPr/>
+          <a:lstStyle/>
+          <a:p>
+            <a:r>
+              <a:rPr lang="en-US" dirty="0"/>
+              <a:t>Step 4: t-test between old and young adults</a:t>
+            </a:r>
+          </a:p>
+        </p:txBody>
+      </p:sp>
+      <p:sp>
+        <p:nvSpPr>
+          <p:cNvPr id="3" name="Content Placeholder 2">
+            <a:extLst>
+              <a:ext uri="{FF2B5EF4-FFF2-40B4-BE49-F238E27FC236}">
+                <a16:creationId xmlns:a16="http://schemas.microsoft.com/office/drawing/2014/main" id="{48A02207-8535-4D41-A650-5C1C982D2886}"/>
+              </a:ext>
+            </a:extLst>
+          </p:cNvPr>
+          <p:cNvSpPr>
+            <a:spLocks noGrp="1"/>
+          </p:cNvSpPr>
+          <p:nvPr>
+            <p:ph idx="1"/>
+          </p:nvPr>
+        </p:nvSpPr>
+        <p:spPr/>
+        <p:txBody>
+          <a:bodyPr/>
+          <a:lstStyle/>
+          <a:p>
+            <a:r>
+              <a:rPr lang="en-US" dirty="0"/>
+              <a:t>Ran independent t-tests to understand if different aspects of executive functioning differed between old (n=152) and young (n=207) participants</a:t>
+            </a:r>
+          </a:p>
+          <a:p>
+            <a:r>
+              <a:rPr lang="en-US" dirty="0"/>
+              <a:t>Components 1 greater in old adults</a:t>
+            </a:r>
+          </a:p>
+          <a:p>
+            <a:pPr lvl="1"/>
+            <a:r>
+              <a:rPr lang="en-US" dirty="0"/>
+              <a:t>Verbal abilities and face memory</a:t>
+            </a:r>
+          </a:p>
+          <a:p>
+            <a:pPr lvl="1"/>
+            <a:r>
+              <a:rPr lang="en-US" dirty="0"/>
+              <a:t>(Not significant if including SES and gender)</a:t>
+            </a:r>
+          </a:p>
+          <a:p>
+            <a:r>
+              <a:rPr lang="en-US" dirty="0"/>
+              <a:t>Components 2 and 3 greater in young adults</a:t>
+            </a:r>
+          </a:p>
+          <a:p>
+            <a:pPr lvl="1"/>
+            <a:r>
+              <a:rPr lang="en-US" dirty="0"/>
+              <a:t>Motor skills, mental flexibility, and object memory</a:t>
+            </a:r>
+          </a:p>
+          <a:p>
+            <a:pPr lvl="1"/>
+            <a:r>
+              <a:rPr lang="en-US" dirty="0"/>
+              <a:t>Vigilance and working memory</a:t>
+            </a:r>
+          </a:p>
+        </p:txBody>
+      </p:sp>
+    </p:spTree>
+    <p:extLst>
+      <p:ext uri="{BB962C8B-B14F-4D97-AF65-F5344CB8AC3E}">
+        <p14:creationId xmlns:p14="http://schemas.microsoft.com/office/powerpoint/2010/main" val="3931142717"/>
+      </p:ext>
+    </p:extLst>
+  </p:cSld>
+  <p:clrMapOvr>
+    <a:masterClrMapping/>
+  </p:clrMapOvr>
+</p:sld>
+</file>
+
+<file path=ppt/slides/slide8.xml><?xml version="1.0" encoding="utf-8"?>
+<p:sld xmlns:a="http://schemas.openxmlformats.org/drawingml/2006/main" xmlns:r="http://schemas.openxmlformats.org/officeDocument/2006/relationships" xmlns:p="http://schemas.openxmlformats.org/presentationml/2006/main">
+  <p:cSld>
+    <p:spTree>
+      <p:nvGrpSpPr>
+        <p:cNvPr id="1" name=""/>
+        <p:cNvGrpSpPr/>
+        <p:nvPr/>
+      </p:nvGrpSpPr>
+      <p:grpSpPr>
+        <a:xfrm>
+          <a:off x="0" y="0"/>
+          <a:ext cx="0" cy="0"/>
+          <a:chOff x="0" y="0"/>
+          <a:chExt cx="0" cy="0"/>
+        </a:xfrm>
+      </p:grpSpPr>
+      <p:pic>
+        <p:nvPicPr>
+          <p:cNvPr id="9" name="Picture 8" descr="A screenshot of a cell phone&#10;&#10;Description automatically generated">
+            <a:extLst>
+              <a:ext uri="{FF2B5EF4-FFF2-40B4-BE49-F238E27FC236}">
+                <a16:creationId xmlns:a16="http://schemas.microsoft.com/office/drawing/2014/main" id="{C9172F1C-9A9C-5B49-80FF-A6047F77C2B1}"/>
+              </a:ext>
+            </a:extLst>
+          </p:cNvPr>
+          <p:cNvPicPr>
+            <a:picLocks noChangeAspect="1"/>
+          </p:cNvPicPr>
+          <p:nvPr/>
+        </p:nvPicPr>
+        <p:blipFill>
+          <a:blip r:embed="rId2"/>
+          <a:stretch>
+            <a:fillRect/>
+          </a:stretch>
+        </p:blipFill>
+        <p:spPr>
+          <a:xfrm>
+            <a:off x="857250" y="727631"/>
+            <a:ext cx="10115550" cy="6098307"/>
+          </a:xfrm>
+          <a:prstGeom prst="rect">
+            <a:avLst/>
+          </a:prstGeom>
+        </p:spPr>
+      </p:pic>
+      <p:sp>
+        <p:nvSpPr>
+          <p:cNvPr id="6" name="Left Bracket 5">
+            <a:extLst>
+              <a:ext uri="{FF2B5EF4-FFF2-40B4-BE49-F238E27FC236}">
+                <a16:creationId xmlns:a16="http://schemas.microsoft.com/office/drawing/2014/main" id="{EABA0BDA-C028-C543-82AA-201A24938989}"/>
+              </a:ext>
+            </a:extLst>
+          </p:cNvPr>
+          <p:cNvSpPr/>
+          <p:nvPr/>
+        </p:nvSpPr>
+        <p:spPr>
+          <a:xfrm rot="5400000">
+            <a:off x="5621981" y="791780"/>
+            <a:ext cx="352720" cy="776288"/>
+          </a:xfrm>
+          <a:prstGeom prst="leftBracket">
+            <a:avLst>
+              <a:gd name="adj" fmla="val 20991"/>
+            </a:avLst>
+          </a:prstGeom>
+          <a:ln w="38100"/>
+        </p:spPr>
+        <p:style>
+          <a:lnRef idx="1">
+            <a:schemeClr val="dk1"/>
+          </a:lnRef>
+          <a:fillRef idx="0">
+            <a:schemeClr val="dk1"/>
+          </a:fillRef>
+          <a:effectRef idx="0">
+            <a:schemeClr val="dk1"/>
+          </a:effectRef>
+          <a:fontRef idx="minor">
+            <a:schemeClr val="tx1"/>
+          </a:fontRef>
+        </p:style>
+        <p:txBody>
+          <a:bodyPr rtlCol="0" anchor="ctr"/>
+          <a:lstStyle/>
+          <a:p>
+            <a:pPr algn="ctr"/>
+            <a:endParaRPr lang="en-US"/>
+          </a:p>
+        </p:txBody>
+      </p:sp>
+      <p:sp>
+        <p:nvSpPr>
+          <p:cNvPr id="7" name="TextBox 6">
+            <a:extLst>
+              <a:ext uri="{FF2B5EF4-FFF2-40B4-BE49-F238E27FC236}">
+                <a16:creationId xmlns:a16="http://schemas.microsoft.com/office/drawing/2014/main" id="{E54EA5EC-4065-CF47-A401-2FA7676A9312}"/>
+              </a:ext>
+            </a:extLst>
+          </p:cNvPr>
+          <p:cNvSpPr txBox="1"/>
+          <p:nvPr/>
+        </p:nvSpPr>
+        <p:spPr>
+          <a:xfrm>
+            <a:off x="5532117" y="727631"/>
+            <a:ext cx="670560" cy="369332"/>
+          </a:xfrm>
+          <a:prstGeom prst="rect">
+            <a:avLst/>
+          </a:prstGeom>
+          <a:noFill/>
+        </p:spPr>
+        <p:txBody>
+          <a:bodyPr wrap="square" rtlCol="0">
+            <a:spAutoFit/>
+          </a:bodyPr>
+          <a:lstStyle/>
+          <a:p>
+            <a:r>
+              <a:rPr lang="en-US" dirty="0"/>
+              <a:t>***</a:t>
+            </a:r>
+          </a:p>
+        </p:txBody>
+      </p:sp>
+      <p:sp>
+        <p:nvSpPr>
+          <p:cNvPr id="10" name="Left Bracket 9">
+            <a:extLst>
+              <a:ext uri="{FF2B5EF4-FFF2-40B4-BE49-F238E27FC236}">
+                <a16:creationId xmlns:a16="http://schemas.microsoft.com/office/drawing/2014/main" id="{958E7BA6-C4D9-A04B-B5D5-FE1ADBA9910A}"/>
+              </a:ext>
+            </a:extLst>
+          </p:cNvPr>
+          <p:cNvSpPr/>
+          <p:nvPr/>
+        </p:nvSpPr>
+        <p:spPr>
+          <a:xfrm rot="5400000">
+            <a:off x="7874644" y="791780"/>
+            <a:ext cx="352720" cy="776288"/>
+          </a:xfrm>
+          <a:prstGeom prst="leftBracket">
+            <a:avLst>
+              <a:gd name="adj" fmla="val 20991"/>
+            </a:avLst>
+          </a:prstGeom>
+          <a:ln w="38100"/>
+        </p:spPr>
+        <p:style>
+          <a:lnRef idx="1">
+            <a:schemeClr val="dk1"/>
+          </a:lnRef>
+          <a:fillRef idx="0">
+            <a:schemeClr val="dk1"/>
+          </a:fillRef>
+          <a:effectRef idx="0">
+            <a:schemeClr val="dk1"/>
+          </a:effectRef>
+          <a:fontRef idx="minor">
+            <a:schemeClr val="tx1"/>
+          </a:fontRef>
+        </p:style>
+        <p:txBody>
+          <a:bodyPr rtlCol="0" anchor="ctr"/>
+          <a:lstStyle/>
+          <a:p>
+            <a:pPr algn="ctr"/>
+            <a:endParaRPr lang="en-US"/>
+          </a:p>
+        </p:txBody>
+      </p:sp>
+      <p:sp>
+        <p:nvSpPr>
+          <p:cNvPr id="11" name="TextBox 10">
+            <a:extLst>
+              <a:ext uri="{FF2B5EF4-FFF2-40B4-BE49-F238E27FC236}">
+                <a16:creationId xmlns:a16="http://schemas.microsoft.com/office/drawing/2014/main" id="{0FA3BEEB-4DF4-FD4E-B1CC-13B7D0AB1237}"/>
+              </a:ext>
+            </a:extLst>
+          </p:cNvPr>
+          <p:cNvSpPr txBox="1"/>
+          <p:nvPr/>
+        </p:nvSpPr>
+        <p:spPr>
+          <a:xfrm>
+            <a:off x="7856219" y="727631"/>
+            <a:ext cx="670560" cy="369332"/>
+          </a:xfrm>
+          <a:prstGeom prst="rect">
+            <a:avLst/>
+          </a:prstGeom>
+          <a:noFill/>
+        </p:spPr>
+        <p:txBody>
+          <a:bodyPr wrap="square" rtlCol="0">
+            <a:spAutoFit/>
+          </a:bodyPr>
+          <a:lstStyle/>
+          <a:p>
+            <a:r>
+              <a:rPr lang="en-US" dirty="0"/>
+              <a:t>**</a:t>
+            </a:r>
+          </a:p>
+        </p:txBody>
+      </p:sp>
+      <p:sp>
+        <p:nvSpPr>
+          <p:cNvPr id="12" name="Left Bracket 11">
+            <a:extLst>
+              <a:ext uri="{FF2B5EF4-FFF2-40B4-BE49-F238E27FC236}">
+                <a16:creationId xmlns:a16="http://schemas.microsoft.com/office/drawing/2014/main" id="{76E0A4AF-7F0F-884B-8C5A-7406681E8015}"/>
+              </a:ext>
+            </a:extLst>
+          </p:cNvPr>
+          <p:cNvSpPr/>
+          <p:nvPr/>
+        </p:nvSpPr>
+        <p:spPr>
+          <a:xfrm rot="5400000">
+            <a:off x="3321688" y="791780"/>
+            <a:ext cx="352720" cy="776288"/>
+          </a:xfrm>
+          <a:prstGeom prst="leftBracket">
+            <a:avLst>
+              <a:gd name="adj" fmla="val 20991"/>
+            </a:avLst>
+          </a:prstGeom>
+          <a:ln w="38100"/>
+        </p:spPr>
+        <p:style>
+          <a:lnRef idx="1">
+            <a:schemeClr val="dk1"/>
+          </a:lnRef>
+          <a:fillRef idx="0">
+            <a:schemeClr val="dk1"/>
+          </a:fillRef>
+          <a:effectRef idx="0">
+            <a:schemeClr val="dk1"/>
+          </a:effectRef>
+          <a:fontRef idx="minor">
+            <a:schemeClr val="tx1"/>
+          </a:fontRef>
+        </p:style>
+        <p:txBody>
+          <a:bodyPr rtlCol="0" anchor="ctr"/>
+          <a:lstStyle/>
+          <a:p>
+            <a:pPr algn="ctr"/>
+            <a:endParaRPr lang="en-US"/>
+          </a:p>
+        </p:txBody>
+      </p:sp>
+      <p:sp>
+        <p:nvSpPr>
+          <p:cNvPr id="13" name="TextBox 12">
+            <a:extLst>
+              <a:ext uri="{FF2B5EF4-FFF2-40B4-BE49-F238E27FC236}">
+                <a16:creationId xmlns:a16="http://schemas.microsoft.com/office/drawing/2014/main" id="{97CDA1D1-B784-E046-85E7-FD967D3E52CF}"/>
+              </a:ext>
+            </a:extLst>
+          </p:cNvPr>
+          <p:cNvSpPr txBox="1"/>
+          <p:nvPr/>
+        </p:nvSpPr>
+        <p:spPr>
+          <a:xfrm>
+            <a:off x="3303263" y="727631"/>
+            <a:ext cx="670560" cy="369332"/>
+          </a:xfrm>
+          <a:prstGeom prst="rect">
+            <a:avLst/>
+          </a:prstGeom>
+          <a:noFill/>
+        </p:spPr>
+        <p:txBody>
+          <a:bodyPr wrap="square" rtlCol="0">
+            <a:spAutoFit/>
+          </a:bodyPr>
+          <a:lstStyle/>
+          <a:p>
+            <a:r>
+              <a:rPr lang="en-US" dirty="0"/>
+              <a:t>**</a:t>
+            </a:r>
+          </a:p>
+        </p:txBody>
+      </p:sp>
+    </p:spTree>
+    <p:extLst>
+      <p:ext uri="{BB962C8B-B14F-4D97-AF65-F5344CB8AC3E}">
+        <p14:creationId xmlns:p14="http://schemas.microsoft.com/office/powerpoint/2010/main" val="2567580217"/>
+      </p:ext>
+    </p:extLst>
+  </p:cSld>
+  <p:clrMapOvr>
+    <a:masterClrMapping/>
+  </p:clrMapOvr>
+</p:sld>
+</file>
+
+<file path=ppt/slides/slide9.xml><?xml version="1.0" encoding="utf-8"?>
+<p:sld xmlns:a="http://schemas.openxmlformats.org/drawingml/2006/main" xmlns:r="http://schemas.openxmlformats.org/officeDocument/2006/relationships" xmlns:p="http://schemas.openxmlformats.org/presentationml/2006/main">
+  <p:cSld>
+    <p:spTree>
+      <p:nvGrpSpPr>
+        <p:cNvPr id="1" name=""/>
+        <p:cNvGrpSpPr/>
+        <p:nvPr/>
+      </p:nvGrpSpPr>
+      <p:grpSpPr>
+        <a:xfrm>
+          <a:off x="0" y="0"/>
+          <a:ext cx="0" cy="0"/>
+          <a:chOff x="0" y="0"/>
+          <a:chExt cx="0" cy="0"/>
+        </a:xfrm>
+      </p:grpSpPr>
+      <p:sp>
+        <p:nvSpPr>
+          <p:cNvPr id="2" name="Title 1">
+            <a:extLst>
+              <a:ext uri="{FF2B5EF4-FFF2-40B4-BE49-F238E27FC236}">
+                <a16:creationId xmlns:a16="http://schemas.microsoft.com/office/drawing/2014/main" id="{C0CDD26D-59AB-F944-AA52-CA121FA51D0D}"/>
+              </a:ext>
+            </a:extLst>
+          </p:cNvPr>
+          <p:cNvSpPr>
+            <a:spLocks noGrp="1"/>
+          </p:cNvSpPr>
+          <p:nvPr>
+            <p:ph type="title"/>
+          </p:nvPr>
+        </p:nvSpPr>
+        <p:spPr/>
+        <p:txBody>
+          <a:bodyPr/>
+          <a:lstStyle/>
+          <a:p>
+            <a:r>
+              <a:rPr lang="en-US" dirty="0"/>
+              <a:t>Step 5: multivariate analysis</a:t>
+            </a:r>
+          </a:p>
+        </p:txBody>
+      </p:sp>
+      <p:sp>
+        <p:nvSpPr>
+          <p:cNvPr id="3" name="Content Placeholder 2">
+            <a:extLst>
+              <a:ext uri="{FF2B5EF4-FFF2-40B4-BE49-F238E27FC236}">
+                <a16:creationId xmlns:a16="http://schemas.microsoft.com/office/drawing/2014/main" id="{2A5F543B-0306-B541-89D1-E16C08A2F2E9}"/>
+              </a:ext>
+            </a:extLst>
+          </p:cNvPr>
+          <p:cNvSpPr>
+            <a:spLocks noGrp="1"/>
+          </p:cNvSpPr>
+          <p:nvPr>
+            <p:ph idx="1"/>
+          </p:nvPr>
+        </p:nvSpPr>
+        <p:spPr/>
+        <p:txBody>
+          <a:bodyPr/>
+          <a:lstStyle/>
+          <a:p>
+            <a:r>
+              <a:rPr lang="en-US" dirty="0"/>
+              <a:t>Assessing the relationship between the 7 components of thought and the 3 measures of EF, as well as interactions with age (n=162 young adults, n=119 old adults)</a:t>
+            </a:r>
+          </a:p>
+          <a:p>
+            <a:r>
+              <a:rPr lang="en-US" dirty="0"/>
+              <a:t>Significant effect of component 2 of EF (motor skills, mental flexibility, and object memory)</a:t>
+            </a:r>
+          </a:p>
+          <a:p>
+            <a:r>
+              <a:rPr lang="en-US" dirty="0"/>
+              <a:t>Positive relationship to component 6 (disjointed and fragmented thinking) and component 7 (thinking in images)</a:t>
+            </a:r>
+          </a:p>
+          <a:p>
+            <a:pPr lvl="1"/>
+            <a:r>
+              <a:rPr lang="en-US" dirty="0"/>
+              <a:t>Interaction with age for component 6 (driven by younger adults)</a:t>
+            </a:r>
+          </a:p>
+          <a:p>
+            <a:endParaRPr lang="en-US" dirty="0"/>
+          </a:p>
+        </p:txBody>
+      </p:sp>
+    </p:spTree>
+    <p:extLst>
+      <p:ext uri="{BB962C8B-B14F-4D97-AF65-F5344CB8AC3E}">
+        <p14:creationId xmlns:p14="http://schemas.microsoft.com/office/powerpoint/2010/main" val="1594755914"/>
       </p:ext>
     </p:extLst>
   </p:cSld>

</xml_diff>

<commit_message>
finished outlier replacement script, ran outlier replacement, created composite scores, ran MV analysis and mediation
</commit_message>
<xml_diff>
--- a/nkiRockland/phenotypic/NKI_ongoing_thought/results/results_so_far.pptx
+++ b/nkiRockland/phenotypic/NKI_ongoing_thought/results/results_so_far.pptx
@@ -10,17 +10,12 @@
     <p:sldId id="264" r:id="rId4"/>
     <p:sldId id="257" r:id="rId5"/>
     <p:sldId id="265" r:id="rId6"/>
-    <p:sldId id="258" r:id="rId7"/>
-    <p:sldId id="266" r:id="rId8"/>
-    <p:sldId id="259" r:id="rId9"/>
-    <p:sldId id="267" r:id="rId10"/>
-    <p:sldId id="260" r:id="rId11"/>
-    <p:sldId id="268" r:id="rId12"/>
-    <p:sldId id="261" r:id="rId13"/>
-    <p:sldId id="269" r:id="rId14"/>
-    <p:sldId id="270" r:id="rId15"/>
-    <p:sldId id="271" r:id="rId16"/>
-    <p:sldId id="272" r:id="rId17"/>
+    <p:sldId id="266" r:id="rId7"/>
+    <p:sldId id="259" r:id="rId8"/>
+    <p:sldId id="267" r:id="rId9"/>
+    <p:sldId id="268" r:id="rId10"/>
+    <p:sldId id="271" r:id="rId11"/>
+    <p:sldId id="272" r:id="rId12"/>
   </p:sldIdLst>
   <p:sldSz cx="12192000" cy="6858000"/>
   <p:notesSz cx="6858000" cy="9144000"/>
@@ -286,7 +281,7 @@
           <a:p>
             <a:fld id="{25FF0A44-147E-3441-A53D-816E14540497}" type="datetimeFigureOut">
               <a:rPr lang="en-US" smtClean="0"/>
-              <a:t>7/20/20</a:t>
+              <a:t>8/6/20</a:t>
             </a:fld>
             <a:endParaRPr lang="en-US"/>
           </a:p>
@@ -484,7 +479,7 @@
           <a:p>
             <a:fld id="{25FF0A44-147E-3441-A53D-816E14540497}" type="datetimeFigureOut">
               <a:rPr lang="en-US" smtClean="0"/>
-              <a:t>7/20/20</a:t>
+              <a:t>8/6/20</a:t>
             </a:fld>
             <a:endParaRPr lang="en-US"/>
           </a:p>
@@ -692,7 +687,7 @@
           <a:p>
             <a:fld id="{25FF0A44-147E-3441-A53D-816E14540497}" type="datetimeFigureOut">
               <a:rPr lang="en-US" smtClean="0"/>
-              <a:t>7/20/20</a:t>
+              <a:t>8/6/20</a:t>
             </a:fld>
             <a:endParaRPr lang="en-US"/>
           </a:p>
@@ -890,7 +885,7 @@
           <a:p>
             <a:fld id="{25FF0A44-147E-3441-A53D-816E14540497}" type="datetimeFigureOut">
               <a:rPr lang="en-US" smtClean="0"/>
-              <a:t>7/20/20</a:t>
+              <a:t>8/6/20</a:t>
             </a:fld>
             <a:endParaRPr lang="en-US"/>
           </a:p>
@@ -1165,7 +1160,7 @@
           <a:p>
             <a:fld id="{25FF0A44-147E-3441-A53D-816E14540497}" type="datetimeFigureOut">
               <a:rPr lang="en-US" smtClean="0"/>
-              <a:t>7/20/20</a:t>
+              <a:t>8/6/20</a:t>
             </a:fld>
             <a:endParaRPr lang="en-US"/>
           </a:p>
@@ -1430,7 +1425,7 @@
           <a:p>
             <a:fld id="{25FF0A44-147E-3441-A53D-816E14540497}" type="datetimeFigureOut">
               <a:rPr lang="en-US" smtClean="0"/>
-              <a:t>7/20/20</a:t>
+              <a:t>8/6/20</a:t>
             </a:fld>
             <a:endParaRPr lang="en-US"/>
           </a:p>
@@ -1842,7 +1837,7 @@
           <a:p>
             <a:fld id="{25FF0A44-147E-3441-A53D-816E14540497}" type="datetimeFigureOut">
               <a:rPr lang="en-US" smtClean="0"/>
-              <a:t>7/20/20</a:t>
+              <a:t>8/6/20</a:t>
             </a:fld>
             <a:endParaRPr lang="en-US"/>
           </a:p>
@@ -1983,7 +1978,7 @@
           <a:p>
             <a:fld id="{25FF0A44-147E-3441-A53D-816E14540497}" type="datetimeFigureOut">
               <a:rPr lang="en-US" smtClean="0"/>
-              <a:t>7/20/20</a:t>
+              <a:t>8/6/20</a:t>
             </a:fld>
             <a:endParaRPr lang="en-US"/>
           </a:p>
@@ -2096,7 +2091,7 @@
           <a:p>
             <a:fld id="{25FF0A44-147E-3441-A53D-816E14540497}" type="datetimeFigureOut">
               <a:rPr lang="en-US" smtClean="0"/>
-              <a:t>7/20/20</a:t>
+              <a:t>8/6/20</a:t>
             </a:fld>
             <a:endParaRPr lang="en-US"/>
           </a:p>
@@ -2407,7 +2402,7 @@
           <a:p>
             <a:fld id="{25FF0A44-147E-3441-A53D-816E14540497}" type="datetimeFigureOut">
               <a:rPr lang="en-US" smtClean="0"/>
-              <a:t>7/20/20</a:t>
+              <a:t>8/6/20</a:t>
             </a:fld>
             <a:endParaRPr lang="en-US"/>
           </a:p>
@@ -2695,7 +2690,7 @@
           <a:p>
             <a:fld id="{25FF0A44-147E-3441-A53D-816E14540497}" type="datetimeFigureOut">
               <a:rPr lang="en-US" smtClean="0"/>
-              <a:t>7/20/20</a:t>
+              <a:t>8/6/20</a:t>
             </a:fld>
             <a:endParaRPr lang="en-US"/>
           </a:p>
@@ -2936,7 +2931,7 @@
           <a:p>
             <a:fld id="{25FF0A44-147E-3441-A53D-816E14540497}" type="datetimeFigureOut">
               <a:rPr lang="en-US" smtClean="0"/>
-              <a:t>7/20/20</a:t>
+              <a:t>8/6/20</a:t>
             </a:fld>
             <a:endParaRPr lang="en-US"/>
           </a:p>
@@ -3445,70 +3440,84 @@
           <a:chExt cx="0" cy="0"/>
         </a:xfrm>
       </p:grpSpPr>
-      <p:pic>
-        <p:nvPicPr>
-          <p:cNvPr id="5" name="Picture 4" descr="A screenshot of a cell phone&#10;&#10;Description automatically generated">
-            <a:extLst>
-              <a:ext uri="{FF2B5EF4-FFF2-40B4-BE49-F238E27FC236}">
-                <a16:creationId xmlns:a16="http://schemas.microsoft.com/office/drawing/2014/main" id="{64FEA7C3-010F-6D49-9FC8-336CE975E88C}"/>
-              </a:ext>
-            </a:extLst>
-          </p:cNvPr>
-          <p:cNvPicPr>
-            <a:picLocks noChangeAspect="1"/>
-          </p:cNvPicPr>
-          <p:nvPr/>
-        </p:nvPicPr>
-        <p:blipFill>
-          <a:blip r:embed="rId2"/>
-          <a:stretch>
-            <a:fillRect/>
-          </a:stretch>
-        </p:blipFill>
-        <p:spPr>
-          <a:xfrm>
-            <a:off x="528638" y="242887"/>
-            <a:ext cx="10701338" cy="1564818"/>
-          </a:xfrm>
-          <a:prstGeom prst="rect">
-            <a:avLst/>
-          </a:prstGeom>
-        </p:spPr>
-      </p:pic>
-      <p:pic>
-        <p:nvPicPr>
-          <p:cNvPr id="9" name="Picture 8" descr="A screenshot of a cell phone&#10;&#10;Description automatically generated">
-            <a:extLst>
-              <a:ext uri="{FF2B5EF4-FFF2-40B4-BE49-F238E27FC236}">
-                <a16:creationId xmlns:a16="http://schemas.microsoft.com/office/drawing/2014/main" id="{9ACE5CE6-233C-2B45-94D0-5B6E61C15A71}"/>
-              </a:ext>
-            </a:extLst>
-          </p:cNvPr>
-          <p:cNvPicPr>
-            <a:picLocks noChangeAspect="1"/>
-          </p:cNvPicPr>
-          <p:nvPr/>
-        </p:nvPicPr>
-        <p:blipFill>
-          <a:blip r:embed="rId3"/>
-          <a:stretch>
-            <a:fillRect/>
-          </a:stretch>
-        </p:blipFill>
-        <p:spPr>
-          <a:xfrm>
-            <a:off x="528638" y="2307767"/>
-            <a:ext cx="10772728" cy="3792995"/>
-          </a:xfrm>
-          <a:prstGeom prst="rect">
-            <a:avLst/>
-          </a:prstGeom>
-        </p:spPr>
-      </p:pic>
+      <p:sp>
+        <p:nvSpPr>
+          <p:cNvPr id="2" name="Title 1">
+            <a:extLst>
+              <a:ext uri="{FF2B5EF4-FFF2-40B4-BE49-F238E27FC236}">
+                <a16:creationId xmlns:a16="http://schemas.microsoft.com/office/drawing/2014/main" id="{6649355A-ED58-EC4F-9839-8A19F9EF9B36}"/>
+              </a:ext>
+            </a:extLst>
+          </p:cNvPr>
+          <p:cNvSpPr>
+            <a:spLocks noGrp="1"/>
+          </p:cNvSpPr>
+          <p:nvPr>
+            <p:ph type="title"/>
+          </p:nvPr>
+        </p:nvSpPr>
+        <p:spPr/>
+        <p:txBody>
+          <a:bodyPr/>
+          <a:lstStyle/>
+          <a:p>
+            <a:r>
+              <a:rPr lang="en-US" dirty="0"/>
+              <a:t>Step 6: formal mediation</a:t>
+            </a:r>
+          </a:p>
+        </p:txBody>
+      </p:sp>
+      <p:sp>
+        <p:nvSpPr>
+          <p:cNvPr id="3" name="Content Placeholder 2">
+            <a:extLst>
+              <a:ext uri="{FF2B5EF4-FFF2-40B4-BE49-F238E27FC236}">
+                <a16:creationId xmlns:a16="http://schemas.microsoft.com/office/drawing/2014/main" id="{523DC28F-4CD2-FA46-9183-2C53F32F49C2}"/>
+              </a:ext>
+            </a:extLst>
+          </p:cNvPr>
+          <p:cNvSpPr>
+            <a:spLocks noGrp="1"/>
+          </p:cNvSpPr>
+          <p:nvPr>
+            <p:ph idx="1"/>
+          </p:nvPr>
+        </p:nvSpPr>
+        <p:spPr/>
+        <p:txBody>
+          <a:bodyPr/>
+          <a:lstStyle/>
+          <a:p>
+            <a:r>
+              <a:rPr lang="en-US" dirty="0"/>
+              <a:t>Ran a formal mediation using PROCESS macro</a:t>
+            </a:r>
+          </a:p>
+          <a:p>
+            <a:r>
+              <a:rPr lang="en-US" dirty="0"/>
+              <a:t>Direct effect of age on thinking in images is non-significant</a:t>
+            </a:r>
+          </a:p>
+          <a:p>
+            <a:r>
+              <a:rPr lang="en-US" dirty="0"/>
+              <a:t>Indirect effect of age on thinking in images (via episodic memory) is significant</a:t>
+            </a:r>
+          </a:p>
+          <a:p>
+            <a:r>
+              <a:rPr lang="en-US" dirty="0"/>
+              <a:t>Evidence for complete mediation</a:t>
+            </a:r>
+          </a:p>
+        </p:txBody>
+      </p:sp>
     </p:spTree>
     <p:extLst>
       <p:ext uri="{BB962C8B-B14F-4D97-AF65-F5344CB8AC3E}">
-        <p14:creationId xmlns:p14="http://schemas.microsoft.com/office/powerpoint/2010/main" val="1828392742"/>
+        <p14:creationId xmlns:p14="http://schemas.microsoft.com/office/powerpoint/2010/main" val="2828049587"/>
       </p:ext>
     </p:extLst>
   </p:cSld>
@@ -3535,104 +3544,12 @@
           <a:chExt cx="0" cy="0"/>
         </a:xfrm>
       </p:grpSpPr>
-      <p:sp>
-        <p:nvSpPr>
-          <p:cNvPr id="2" name="Title 1">
-            <a:extLst>
-              <a:ext uri="{FF2B5EF4-FFF2-40B4-BE49-F238E27FC236}">
-                <a16:creationId xmlns:a16="http://schemas.microsoft.com/office/drawing/2014/main" id="{3849E5B2-EC9D-C84B-B07C-D45B304C79C0}"/>
-              </a:ext>
-            </a:extLst>
-          </p:cNvPr>
-          <p:cNvSpPr>
-            <a:spLocks noGrp="1"/>
-          </p:cNvSpPr>
-          <p:nvPr>
-            <p:ph type="title"/>
-          </p:nvPr>
-        </p:nvSpPr>
-        <p:spPr/>
-        <p:txBody>
-          <a:bodyPr/>
-          <a:lstStyle/>
-          <a:p>
-            <a:r>
-              <a:rPr lang="en-US" dirty="0"/>
-              <a:t>Noticed: age no longer significant</a:t>
-            </a:r>
-          </a:p>
-        </p:txBody>
-      </p:sp>
-      <p:sp>
-        <p:nvSpPr>
-          <p:cNvPr id="3" name="Content Placeholder 2">
-            <a:extLst>
-              <a:ext uri="{FF2B5EF4-FFF2-40B4-BE49-F238E27FC236}">
-                <a16:creationId xmlns:a16="http://schemas.microsoft.com/office/drawing/2014/main" id="{371601AC-8E76-DA48-9FA3-294F6953F4F9}"/>
-              </a:ext>
-            </a:extLst>
-          </p:cNvPr>
-          <p:cNvSpPr>
-            <a:spLocks noGrp="1"/>
-          </p:cNvSpPr>
-          <p:nvPr>
-            <p:ph idx="1"/>
-          </p:nvPr>
-        </p:nvSpPr>
-        <p:spPr/>
-        <p:txBody>
-          <a:bodyPr/>
-          <a:lstStyle/>
-          <a:p>
-            <a:r>
-              <a:rPr lang="en-US" dirty="0"/>
-              <a:t>In this model, age no longer related to component 7 (thinking in images)</a:t>
-            </a:r>
-          </a:p>
-          <a:p>
-            <a:r>
-              <a:rPr lang="en-US" dirty="0"/>
-              <a:t>Potential mediation by EF</a:t>
-            </a:r>
-          </a:p>
-        </p:txBody>
-      </p:sp>
-    </p:spTree>
-    <p:extLst>
-      <p:ext uri="{BB962C8B-B14F-4D97-AF65-F5344CB8AC3E}">
-        <p14:creationId xmlns:p14="http://schemas.microsoft.com/office/powerpoint/2010/main" val="1873381221"/>
-      </p:ext>
-    </p:extLst>
-  </p:cSld>
-  <p:clrMapOvr>
-    <a:masterClrMapping/>
-  </p:clrMapOvr>
-</p:sld>
-</file>
-
-<file path=ppt/slides/slide12.xml><?xml version="1.0" encoding="utf-8"?>
-<p:sld xmlns:a="http://schemas.openxmlformats.org/drawingml/2006/main" xmlns:r="http://schemas.openxmlformats.org/officeDocument/2006/relationships" xmlns:p="http://schemas.openxmlformats.org/presentationml/2006/main">
-  <p:cSld>
-    <p:spTree>
-      <p:nvGrpSpPr>
-        <p:cNvPr id="1" name=""/>
-        <p:cNvGrpSpPr/>
-        <p:nvPr/>
-      </p:nvGrpSpPr>
-      <p:grpSpPr>
-        <a:xfrm>
-          <a:off x="0" y="0"/>
-          <a:ext cx="0" cy="0"/>
-          <a:chOff x="0" y="0"/>
-          <a:chExt cx="0" cy="0"/>
-        </a:xfrm>
-      </p:grpSpPr>
       <p:pic>
         <p:nvPicPr>
-          <p:cNvPr id="5" name="Picture 4" descr="A screenshot of a cell phone&#10;&#10;Description automatically generated">
-            <a:extLst>
-              <a:ext uri="{FF2B5EF4-FFF2-40B4-BE49-F238E27FC236}">
-                <a16:creationId xmlns:a16="http://schemas.microsoft.com/office/drawing/2014/main" id="{64EE728D-7FE3-CD43-BEBB-D6917FA5DD8A}"/>
+          <p:cNvPr id="5" name="Picture 4">
+            <a:extLst>
+              <a:ext uri="{FF2B5EF4-FFF2-40B4-BE49-F238E27FC236}">
+                <a16:creationId xmlns:a16="http://schemas.microsoft.com/office/drawing/2014/main" id="{03EAAB8C-9476-CA4D-848D-417C7DB0DBB2}"/>
               </a:ext>
             </a:extLst>
           </p:cNvPr>
@@ -3643,756 +3560,13 @@
         </p:nvPicPr>
         <p:blipFill>
           <a:blip r:embed="rId2"/>
-          <a:stretch>
-            <a:fillRect/>
-          </a:stretch>
-        </p:blipFill>
-        <p:spPr>
-          <a:xfrm>
-            <a:off x="421175" y="1436687"/>
-            <a:ext cx="11349649" cy="3984625"/>
-          </a:xfrm>
-          <a:prstGeom prst="rect">
-            <a:avLst/>
-          </a:prstGeom>
-        </p:spPr>
-      </p:pic>
-    </p:spTree>
-    <p:extLst>
-      <p:ext uri="{BB962C8B-B14F-4D97-AF65-F5344CB8AC3E}">
-        <p14:creationId xmlns:p14="http://schemas.microsoft.com/office/powerpoint/2010/main" val="3460276502"/>
-      </p:ext>
-    </p:extLst>
-  </p:cSld>
-  <p:clrMapOvr>
-    <a:masterClrMapping/>
-  </p:clrMapOvr>
-</p:sld>
-</file>
-
-<file path=ppt/slides/slide13.xml><?xml version="1.0" encoding="utf-8"?>
-<p:sld xmlns:a="http://schemas.openxmlformats.org/drawingml/2006/main" xmlns:r="http://schemas.openxmlformats.org/officeDocument/2006/relationships" xmlns:p="http://schemas.openxmlformats.org/presentationml/2006/main">
-  <p:cSld>
-    <p:spTree>
-      <p:nvGrpSpPr>
-        <p:cNvPr id="1" name=""/>
-        <p:cNvGrpSpPr/>
-        <p:nvPr/>
-      </p:nvGrpSpPr>
-      <p:grpSpPr>
-        <a:xfrm>
-          <a:off x="0" y="0"/>
-          <a:ext cx="0" cy="0"/>
-          <a:chOff x="0" y="0"/>
-          <a:chExt cx="0" cy="0"/>
-        </a:xfrm>
-      </p:grpSpPr>
-      <p:sp>
-        <p:nvSpPr>
-          <p:cNvPr id="2" name="Title 1">
-            <a:extLst>
-              <a:ext uri="{FF2B5EF4-FFF2-40B4-BE49-F238E27FC236}">
-                <a16:creationId xmlns:a16="http://schemas.microsoft.com/office/drawing/2014/main" id="{740FE650-EA49-E748-8A13-87593ECCD589}"/>
-              </a:ext>
-            </a:extLst>
-          </p:cNvPr>
-          <p:cNvSpPr>
-            <a:spLocks noGrp="1"/>
-          </p:cNvSpPr>
-          <p:nvPr>
-            <p:ph type="title"/>
-          </p:nvPr>
-        </p:nvSpPr>
-        <p:spPr/>
-        <p:txBody>
-          <a:bodyPr/>
-          <a:lstStyle/>
-          <a:p>
-            <a:r>
-              <a:rPr lang="en-US" dirty="0"/>
-              <a:t>Step 6: mediation checks</a:t>
-            </a:r>
-          </a:p>
-        </p:txBody>
-      </p:sp>
-      <p:cxnSp>
-        <p:nvCxnSpPr>
-          <p:cNvPr id="5" name="Straight Arrow Connector 4">
-            <a:extLst>
-              <a:ext uri="{FF2B5EF4-FFF2-40B4-BE49-F238E27FC236}">
-                <a16:creationId xmlns:a16="http://schemas.microsoft.com/office/drawing/2014/main" id="{CE4B0EE1-BDB1-AF4B-AD1D-31C081367248}"/>
-              </a:ext>
-            </a:extLst>
-          </p:cNvPr>
-          <p:cNvCxnSpPr/>
-          <p:nvPr/>
-        </p:nvCxnSpPr>
-        <p:spPr>
-          <a:xfrm flipV="1">
-            <a:off x="2428875" y="2757488"/>
-            <a:ext cx="2114550" cy="2543175"/>
-          </a:xfrm>
-          <a:prstGeom prst="straightConnector1">
-            <a:avLst/>
-          </a:prstGeom>
-          <a:ln w="38100">
-            <a:solidFill>
-              <a:schemeClr val="tx1"/>
-            </a:solidFill>
-            <a:tailEnd type="triangle"/>
-          </a:ln>
-        </p:spPr>
-        <p:style>
-          <a:lnRef idx="1">
-            <a:schemeClr val="dk1"/>
-          </a:lnRef>
-          <a:fillRef idx="0">
-            <a:schemeClr val="dk1"/>
-          </a:fillRef>
-          <a:effectRef idx="0">
-            <a:schemeClr val="dk1"/>
-          </a:effectRef>
-          <a:fontRef idx="minor">
-            <a:schemeClr val="tx1"/>
-          </a:fontRef>
-        </p:style>
-      </p:cxnSp>
-      <p:cxnSp>
-        <p:nvCxnSpPr>
-          <p:cNvPr id="6" name="Straight Arrow Connector 5">
-            <a:extLst>
-              <a:ext uri="{FF2B5EF4-FFF2-40B4-BE49-F238E27FC236}">
-                <a16:creationId xmlns:a16="http://schemas.microsoft.com/office/drawing/2014/main" id="{91F72CE2-06FF-7940-85AE-3349E05FE5ED}"/>
-              </a:ext>
-            </a:extLst>
-          </p:cNvPr>
-          <p:cNvCxnSpPr>
-            <a:cxnSpLocks/>
-          </p:cNvCxnSpPr>
-          <p:nvPr/>
-        </p:nvCxnSpPr>
-        <p:spPr>
-          <a:xfrm>
-            <a:off x="6724650" y="2757489"/>
-            <a:ext cx="2462213" cy="2543174"/>
-          </a:xfrm>
-          <a:prstGeom prst="straightConnector1">
-            <a:avLst/>
-          </a:prstGeom>
-          <a:ln w="38100">
-            <a:solidFill>
-              <a:schemeClr val="tx1"/>
-            </a:solidFill>
-            <a:tailEnd type="triangle"/>
-          </a:ln>
-        </p:spPr>
-        <p:style>
-          <a:lnRef idx="1">
-            <a:schemeClr val="dk1"/>
-          </a:lnRef>
-          <a:fillRef idx="0">
-            <a:schemeClr val="dk1"/>
-          </a:fillRef>
-          <a:effectRef idx="0">
-            <a:schemeClr val="dk1"/>
-          </a:effectRef>
-          <a:fontRef idx="minor">
-            <a:schemeClr val="tx1"/>
-          </a:fontRef>
-        </p:style>
-      </p:cxnSp>
-      <p:cxnSp>
-        <p:nvCxnSpPr>
-          <p:cNvPr id="8" name="Straight Arrow Connector 7">
-            <a:extLst>
-              <a:ext uri="{FF2B5EF4-FFF2-40B4-BE49-F238E27FC236}">
-                <a16:creationId xmlns:a16="http://schemas.microsoft.com/office/drawing/2014/main" id="{775F49CD-2FCA-284D-914E-5DF85ACD7BE1}"/>
-              </a:ext>
-            </a:extLst>
-          </p:cNvPr>
-          <p:cNvCxnSpPr>
-            <a:cxnSpLocks/>
-          </p:cNvCxnSpPr>
-          <p:nvPr/>
-        </p:nvCxnSpPr>
-        <p:spPr>
-          <a:xfrm>
-            <a:off x="2628900" y="5857875"/>
-            <a:ext cx="6315075" cy="0"/>
-          </a:xfrm>
-          <a:prstGeom prst="straightConnector1">
-            <a:avLst/>
-          </a:prstGeom>
-          <a:ln w="38100">
-            <a:solidFill>
-              <a:schemeClr val="tx1"/>
-            </a:solidFill>
-            <a:tailEnd type="triangle"/>
-          </a:ln>
-        </p:spPr>
-        <p:style>
-          <a:lnRef idx="1">
-            <a:schemeClr val="dk1"/>
-          </a:lnRef>
-          <a:fillRef idx="0">
-            <a:schemeClr val="dk1"/>
-          </a:fillRef>
-          <a:effectRef idx="0">
-            <a:schemeClr val="dk1"/>
-          </a:effectRef>
-          <a:fontRef idx="minor">
-            <a:schemeClr val="tx1"/>
-          </a:fontRef>
-        </p:style>
-      </p:cxnSp>
-      <p:sp>
-        <p:nvSpPr>
-          <p:cNvPr id="13" name="TextBox 12">
-            <a:extLst>
-              <a:ext uri="{FF2B5EF4-FFF2-40B4-BE49-F238E27FC236}">
-                <a16:creationId xmlns:a16="http://schemas.microsoft.com/office/drawing/2014/main" id="{87BEEDFA-002E-F746-BCD3-9B623862E6F6}"/>
-              </a:ext>
-            </a:extLst>
-          </p:cNvPr>
-          <p:cNvSpPr txBox="1"/>
-          <p:nvPr/>
-        </p:nvSpPr>
-        <p:spPr>
-          <a:xfrm>
-            <a:off x="4619625" y="1922562"/>
-            <a:ext cx="2028825" cy="923330"/>
-          </a:xfrm>
-          <a:prstGeom prst="rect">
-            <a:avLst/>
-          </a:prstGeom>
-          <a:noFill/>
-        </p:spPr>
-        <p:txBody>
-          <a:bodyPr wrap="square" rtlCol="0">
-            <a:spAutoFit/>
-          </a:bodyPr>
-          <a:lstStyle/>
-          <a:p>
-            <a:pPr algn="ctr"/>
-            <a:r>
-              <a:rPr lang="en-US" dirty="0"/>
-              <a:t>Executive functioning (component 2)</a:t>
-            </a:r>
-          </a:p>
-        </p:txBody>
-      </p:sp>
-      <p:sp>
-        <p:nvSpPr>
-          <p:cNvPr id="14" name="TextBox 13">
-            <a:extLst>
-              <a:ext uri="{FF2B5EF4-FFF2-40B4-BE49-F238E27FC236}">
-                <a16:creationId xmlns:a16="http://schemas.microsoft.com/office/drawing/2014/main" id="{4FF893DD-EC41-1944-9445-6817FA857299}"/>
-              </a:ext>
-            </a:extLst>
-          </p:cNvPr>
-          <p:cNvSpPr txBox="1"/>
-          <p:nvPr/>
-        </p:nvSpPr>
-        <p:spPr>
-          <a:xfrm>
-            <a:off x="1152525" y="5488543"/>
-            <a:ext cx="2028825" cy="369332"/>
-          </a:xfrm>
-          <a:prstGeom prst="rect">
-            <a:avLst/>
-          </a:prstGeom>
-          <a:noFill/>
-        </p:spPr>
-        <p:txBody>
-          <a:bodyPr wrap="square" rtlCol="0">
-            <a:spAutoFit/>
-          </a:bodyPr>
-          <a:lstStyle/>
-          <a:p>
-            <a:pPr algn="ctr"/>
-            <a:r>
-              <a:rPr lang="en-US" dirty="0"/>
-              <a:t>Age</a:t>
-            </a:r>
-          </a:p>
-        </p:txBody>
-      </p:sp>
-      <p:sp>
-        <p:nvSpPr>
-          <p:cNvPr id="15" name="TextBox 14">
-            <a:extLst>
-              <a:ext uri="{FF2B5EF4-FFF2-40B4-BE49-F238E27FC236}">
-                <a16:creationId xmlns:a16="http://schemas.microsoft.com/office/drawing/2014/main" id="{29C62052-3B34-E24C-88EF-3D353A2F5CD9}"/>
-              </a:ext>
-            </a:extLst>
-          </p:cNvPr>
-          <p:cNvSpPr txBox="1"/>
-          <p:nvPr/>
-        </p:nvSpPr>
-        <p:spPr>
-          <a:xfrm>
-            <a:off x="8929689" y="5431393"/>
-            <a:ext cx="2028825" cy="646331"/>
-          </a:xfrm>
-          <a:prstGeom prst="rect">
-            <a:avLst/>
-          </a:prstGeom>
-          <a:noFill/>
-        </p:spPr>
-        <p:txBody>
-          <a:bodyPr wrap="square" rtlCol="0">
-            <a:spAutoFit/>
-          </a:bodyPr>
-          <a:lstStyle/>
-          <a:p>
-            <a:pPr algn="ctr"/>
-            <a:r>
-              <a:rPr lang="en-US" dirty="0"/>
-              <a:t>Thinking in images (component 7)</a:t>
-            </a:r>
-          </a:p>
-        </p:txBody>
-      </p:sp>
-      <p:pic>
-        <p:nvPicPr>
-          <p:cNvPr id="19" name="Picture 18" descr="A screenshot of a cell phone&#10;&#10;Description automatically generated">
-            <a:extLst>
-              <a:ext uri="{FF2B5EF4-FFF2-40B4-BE49-F238E27FC236}">
-                <a16:creationId xmlns:a16="http://schemas.microsoft.com/office/drawing/2014/main" id="{BF40F756-B664-BB4E-858E-A78C95626C73}"/>
-              </a:ext>
-            </a:extLst>
-          </p:cNvPr>
-          <p:cNvPicPr>
-            <a:picLocks noChangeAspect="1"/>
-          </p:cNvPicPr>
-          <p:nvPr/>
-        </p:nvPicPr>
-        <p:blipFill rotWithShape="1">
-          <a:blip r:embed="rId2"/>
-          <a:srcRect t="61445"/>
+          <a:srcRect/>
           <a:stretch/>
         </p:blipFill>
         <p:spPr>
           <a:xfrm>
-            <a:off x="2166937" y="6184195"/>
-            <a:ext cx="7137400" cy="646331"/>
-          </a:xfrm>
-          <a:prstGeom prst="rect">
-            <a:avLst/>
-          </a:prstGeom>
-        </p:spPr>
-      </p:pic>
-      <p:pic>
-        <p:nvPicPr>
-          <p:cNvPr id="21" name="Picture 20" descr="A screenshot of a cell phone&#10;&#10;Description automatically generated">
-            <a:extLst>
-              <a:ext uri="{FF2B5EF4-FFF2-40B4-BE49-F238E27FC236}">
-                <a16:creationId xmlns:a16="http://schemas.microsoft.com/office/drawing/2014/main" id="{AF6E4758-579F-F345-95D4-24D355228715}"/>
-              </a:ext>
-            </a:extLst>
-          </p:cNvPr>
-          <p:cNvPicPr>
-            <a:picLocks noChangeAspect="1"/>
-          </p:cNvPicPr>
-          <p:nvPr/>
-        </p:nvPicPr>
-        <p:blipFill rotWithShape="1">
-          <a:blip r:embed="rId3"/>
-          <a:srcRect t="61923" r="43153"/>
-          <a:stretch/>
-        </p:blipFill>
-        <p:spPr>
-          <a:xfrm>
-            <a:off x="0" y="2385240"/>
-            <a:ext cx="4086225" cy="623811"/>
-          </a:xfrm>
-          <a:prstGeom prst="rect">
-            <a:avLst/>
-          </a:prstGeom>
-        </p:spPr>
-      </p:pic>
-      <p:pic>
-        <p:nvPicPr>
-          <p:cNvPr id="22" name="Picture 21" descr="A screenshot of a cell phone&#10;&#10;Description automatically generated">
-            <a:extLst>
-              <a:ext uri="{FF2B5EF4-FFF2-40B4-BE49-F238E27FC236}">
-                <a16:creationId xmlns:a16="http://schemas.microsoft.com/office/drawing/2014/main" id="{654C0424-9414-9549-9007-938485A61331}"/>
-              </a:ext>
-            </a:extLst>
-          </p:cNvPr>
-          <p:cNvPicPr>
-            <a:picLocks noChangeAspect="1"/>
-          </p:cNvPicPr>
-          <p:nvPr/>
-        </p:nvPicPr>
-        <p:blipFill rotWithShape="1">
-          <a:blip r:embed="rId3"/>
-          <a:srcRect l="57111" t="61923"/>
-          <a:stretch/>
-        </p:blipFill>
-        <p:spPr>
-          <a:xfrm>
-            <a:off x="625474" y="2942452"/>
-            <a:ext cx="3082925" cy="623811"/>
-          </a:xfrm>
-          <a:prstGeom prst="rect">
-            <a:avLst/>
-          </a:prstGeom>
-        </p:spPr>
-      </p:pic>
-      <p:pic>
-        <p:nvPicPr>
-          <p:cNvPr id="24" name="Picture 23" descr="A screenshot of a cell phone&#10;&#10;Description automatically generated">
-            <a:extLst>
-              <a:ext uri="{FF2B5EF4-FFF2-40B4-BE49-F238E27FC236}">
-                <a16:creationId xmlns:a16="http://schemas.microsoft.com/office/drawing/2014/main" id="{54BEB0EF-DC88-0C43-9534-256C05ECC7F8}"/>
-              </a:ext>
-            </a:extLst>
-          </p:cNvPr>
-          <p:cNvPicPr>
-            <a:picLocks noChangeAspect="1"/>
-          </p:cNvPicPr>
-          <p:nvPr/>
-        </p:nvPicPr>
-        <p:blipFill rotWithShape="1">
-          <a:blip r:embed="rId4"/>
-          <a:srcRect t="56500" r="37678"/>
-          <a:stretch/>
-        </p:blipFill>
-        <p:spPr>
-          <a:xfrm>
-            <a:off x="7181850" y="2384585"/>
-            <a:ext cx="5010150" cy="745806"/>
-          </a:xfrm>
-          <a:prstGeom prst="rect">
-            <a:avLst/>
-          </a:prstGeom>
-        </p:spPr>
-      </p:pic>
-      <p:pic>
-        <p:nvPicPr>
-          <p:cNvPr id="25" name="Picture 24" descr="A screenshot of a cell phone&#10;&#10;Description automatically generated">
-            <a:extLst>
-              <a:ext uri="{FF2B5EF4-FFF2-40B4-BE49-F238E27FC236}">
-                <a16:creationId xmlns:a16="http://schemas.microsoft.com/office/drawing/2014/main" id="{5A2DF8BF-DD40-2F42-9B4A-758B56F5C4C4}"/>
-              </a:ext>
-            </a:extLst>
-          </p:cNvPr>
-          <p:cNvPicPr>
-            <a:picLocks noChangeAspect="1"/>
-          </p:cNvPicPr>
-          <p:nvPr/>
-        </p:nvPicPr>
-        <p:blipFill rotWithShape="1">
-          <a:blip r:embed="rId4"/>
-          <a:srcRect l="62618" t="56500"/>
-          <a:stretch/>
-        </p:blipFill>
-        <p:spPr>
-          <a:xfrm>
-            <a:off x="8561387" y="3245884"/>
-            <a:ext cx="3005139" cy="745806"/>
-          </a:xfrm>
-          <a:prstGeom prst="rect">
-            <a:avLst/>
-          </a:prstGeom>
-        </p:spPr>
-      </p:pic>
-    </p:spTree>
-    <p:extLst>
-      <p:ext uri="{BB962C8B-B14F-4D97-AF65-F5344CB8AC3E}">
-        <p14:creationId xmlns:p14="http://schemas.microsoft.com/office/powerpoint/2010/main" val="3825437279"/>
-      </p:ext>
-    </p:extLst>
-  </p:cSld>
-  <p:clrMapOvr>
-    <a:masterClrMapping/>
-  </p:clrMapOvr>
-</p:sld>
-</file>
-
-<file path=ppt/slides/slide14.xml><?xml version="1.0" encoding="utf-8"?>
-<p:sld xmlns:a="http://schemas.openxmlformats.org/drawingml/2006/main" xmlns:r="http://schemas.openxmlformats.org/officeDocument/2006/relationships" xmlns:p="http://schemas.openxmlformats.org/presentationml/2006/main">
-  <p:cSld>
-    <p:spTree>
-      <p:nvGrpSpPr>
-        <p:cNvPr id="1" name=""/>
-        <p:cNvGrpSpPr/>
-        <p:nvPr/>
-      </p:nvGrpSpPr>
-      <p:grpSpPr>
-        <a:xfrm>
-          <a:off x="0" y="0"/>
-          <a:ext cx="0" cy="0"/>
-          <a:chOff x="0" y="0"/>
-          <a:chExt cx="0" cy="0"/>
-        </a:xfrm>
-      </p:grpSpPr>
-      <p:sp>
-        <p:nvSpPr>
-          <p:cNvPr id="2" name="Title 1">
-            <a:extLst>
-              <a:ext uri="{FF2B5EF4-FFF2-40B4-BE49-F238E27FC236}">
-                <a16:creationId xmlns:a16="http://schemas.microsoft.com/office/drawing/2014/main" id="{AB56715D-D27A-0A48-8BFB-659C5D1E3853}"/>
-              </a:ext>
-            </a:extLst>
-          </p:cNvPr>
-          <p:cNvSpPr>
-            <a:spLocks noGrp="1"/>
-          </p:cNvSpPr>
-          <p:nvPr>
-            <p:ph type="title"/>
-          </p:nvPr>
-        </p:nvSpPr>
-        <p:spPr/>
-        <p:txBody>
-          <a:bodyPr/>
-          <a:lstStyle/>
-          <a:p>
-            <a:r>
-              <a:rPr lang="en-US" dirty="0"/>
-              <a:t>Step 6: mediation checks</a:t>
-            </a:r>
-          </a:p>
-        </p:txBody>
-      </p:sp>
-      <p:sp>
-        <p:nvSpPr>
-          <p:cNvPr id="3" name="Content Placeholder 2">
-            <a:extLst>
-              <a:ext uri="{FF2B5EF4-FFF2-40B4-BE49-F238E27FC236}">
-                <a16:creationId xmlns:a16="http://schemas.microsoft.com/office/drawing/2014/main" id="{4E21FA50-7A19-704E-8B11-CFCE6D3712E2}"/>
-              </a:ext>
-            </a:extLst>
-          </p:cNvPr>
-          <p:cNvSpPr>
-            <a:spLocks noGrp="1"/>
-          </p:cNvSpPr>
-          <p:nvPr>
-            <p:ph idx="1"/>
-          </p:nvPr>
-        </p:nvSpPr>
-        <p:spPr/>
-        <p:txBody>
-          <a:bodyPr/>
-          <a:lstStyle/>
-          <a:p>
-            <a:r>
-              <a:rPr lang="en-US" dirty="0"/>
-              <a:t>Age predicts EF</a:t>
-            </a:r>
-          </a:p>
-          <a:p>
-            <a:r>
-              <a:rPr lang="en-US" dirty="0"/>
-              <a:t>EF predicts thinking in images</a:t>
-            </a:r>
-          </a:p>
-          <a:p>
-            <a:r>
-              <a:rPr lang="en-US" dirty="0"/>
-              <a:t>Age predicts thinking in pictures</a:t>
-            </a:r>
-          </a:p>
-          <a:p>
-            <a:endParaRPr lang="en-US" dirty="0"/>
-          </a:p>
-          <a:p>
-            <a:r>
-              <a:rPr lang="en-US" dirty="0"/>
-              <a:t>Age no longer predicts thinking in pictures if EF is included in the model</a:t>
-            </a:r>
-          </a:p>
-        </p:txBody>
-      </p:sp>
-      <p:pic>
-        <p:nvPicPr>
-          <p:cNvPr id="7" name="Picture 6" descr="A screenshot of a cell phone&#10;&#10;Description automatically generated">
-            <a:extLst>
-              <a:ext uri="{FF2B5EF4-FFF2-40B4-BE49-F238E27FC236}">
-                <a16:creationId xmlns:a16="http://schemas.microsoft.com/office/drawing/2014/main" id="{338CF9B6-E404-2F49-B391-CEEF1AFE3412}"/>
-              </a:ext>
-            </a:extLst>
-          </p:cNvPr>
-          <p:cNvPicPr>
-            <a:picLocks noChangeAspect="1"/>
-          </p:cNvPicPr>
-          <p:nvPr/>
-        </p:nvPicPr>
-        <p:blipFill>
-          <a:blip r:embed="rId2"/>
-          <a:stretch>
-            <a:fillRect/>
-          </a:stretch>
-        </p:blipFill>
-        <p:spPr>
-          <a:xfrm>
-            <a:off x="2533650" y="4397375"/>
-            <a:ext cx="8153400" cy="2095500"/>
-          </a:xfrm>
-          <a:prstGeom prst="rect">
-            <a:avLst/>
-          </a:prstGeom>
-        </p:spPr>
-      </p:pic>
-    </p:spTree>
-    <p:extLst>
-      <p:ext uri="{BB962C8B-B14F-4D97-AF65-F5344CB8AC3E}">
-        <p14:creationId xmlns:p14="http://schemas.microsoft.com/office/powerpoint/2010/main" val="125230913"/>
-      </p:ext>
-    </p:extLst>
-  </p:cSld>
-  <p:clrMapOvr>
-    <a:masterClrMapping/>
-  </p:clrMapOvr>
-</p:sld>
-</file>
-
-<file path=ppt/slides/slide15.xml><?xml version="1.0" encoding="utf-8"?>
-<p:sld xmlns:a="http://schemas.openxmlformats.org/drawingml/2006/main" xmlns:r="http://schemas.openxmlformats.org/officeDocument/2006/relationships" xmlns:p="http://schemas.openxmlformats.org/presentationml/2006/main">
-  <p:cSld>
-    <p:spTree>
-      <p:nvGrpSpPr>
-        <p:cNvPr id="1" name=""/>
-        <p:cNvGrpSpPr/>
-        <p:nvPr/>
-      </p:nvGrpSpPr>
-      <p:grpSpPr>
-        <a:xfrm>
-          <a:off x="0" y="0"/>
-          <a:ext cx="0" cy="0"/>
-          <a:chOff x="0" y="0"/>
-          <a:chExt cx="0" cy="0"/>
-        </a:xfrm>
-      </p:grpSpPr>
-      <p:sp>
-        <p:nvSpPr>
-          <p:cNvPr id="2" name="Title 1">
-            <a:extLst>
-              <a:ext uri="{FF2B5EF4-FFF2-40B4-BE49-F238E27FC236}">
-                <a16:creationId xmlns:a16="http://schemas.microsoft.com/office/drawing/2014/main" id="{6649355A-ED58-EC4F-9839-8A19F9EF9B36}"/>
-              </a:ext>
-            </a:extLst>
-          </p:cNvPr>
-          <p:cNvSpPr>
-            <a:spLocks noGrp="1"/>
-          </p:cNvSpPr>
-          <p:nvPr>
-            <p:ph type="title"/>
-          </p:nvPr>
-        </p:nvSpPr>
-        <p:spPr/>
-        <p:txBody>
-          <a:bodyPr/>
-          <a:lstStyle/>
-          <a:p>
-            <a:r>
-              <a:rPr lang="en-US" dirty="0"/>
-              <a:t>Step 7: formal mediation</a:t>
-            </a:r>
-          </a:p>
-        </p:txBody>
-      </p:sp>
-      <p:sp>
-        <p:nvSpPr>
-          <p:cNvPr id="3" name="Content Placeholder 2">
-            <a:extLst>
-              <a:ext uri="{FF2B5EF4-FFF2-40B4-BE49-F238E27FC236}">
-                <a16:creationId xmlns:a16="http://schemas.microsoft.com/office/drawing/2014/main" id="{523DC28F-4CD2-FA46-9183-2C53F32F49C2}"/>
-              </a:ext>
-            </a:extLst>
-          </p:cNvPr>
-          <p:cNvSpPr>
-            <a:spLocks noGrp="1"/>
-          </p:cNvSpPr>
-          <p:nvPr>
-            <p:ph idx="1"/>
-          </p:nvPr>
-        </p:nvSpPr>
-        <p:spPr/>
-        <p:txBody>
-          <a:bodyPr/>
-          <a:lstStyle/>
-          <a:p>
-            <a:r>
-              <a:rPr lang="en-US" dirty="0"/>
-              <a:t>Ran a formal mediation using PROCESS macro</a:t>
-            </a:r>
-          </a:p>
-          <a:p>
-            <a:r>
-              <a:rPr lang="en-US" dirty="0"/>
-              <a:t>Direct effect of age on thinking in images is non-significant</a:t>
-            </a:r>
-          </a:p>
-          <a:p>
-            <a:r>
-              <a:rPr lang="en-US" dirty="0"/>
-              <a:t>Indirect effect of age on thinking in images (via EF) is significant</a:t>
-            </a:r>
-          </a:p>
-          <a:p>
-            <a:r>
-              <a:rPr lang="en-US" dirty="0"/>
-              <a:t>Evidence for complete mediation</a:t>
-            </a:r>
-          </a:p>
-        </p:txBody>
-      </p:sp>
-    </p:spTree>
-    <p:extLst>
-      <p:ext uri="{BB962C8B-B14F-4D97-AF65-F5344CB8AC3E}">
-        <p14:creationId xmlns:p14="http://schemas.microsoft.com/office/powerpoint/2010/main" val="2828049587"/>
-      </p:ext>
-    </p:extLst>
-  </p:cSld>
-  <p:clrMapOvr>
-    <a:masterClrMapping/>
-  </p:clrMapOvr>
-</p:sld>
-</file>
-
-<file path=ppt/slides/slide16.xml><?xml version="1.0" encoding="utf-8"?>
-<p:sld xmlns:a="http://schemas.openxmlformats.org/drawingml/2006/main" xmlns:r="http://schemas.openxmlformats.org/officeDocument/2006/relationships" xmlns:p="http://schemas.openxmlformats.org/presentationml/2006/main">
-  <p:cSld>
-    <p:spTree>
-      <p:nvGrpSpPr>
-        <p:cNvPr id="1" name=""/>
-        <p:cNvGrpSpPr/>
-        <p:nvPr/>
-      </p:nvGrpSpPr>
-      <p:grpSpPr>
-        <a:xfrm>
-          <a:off x="0" y="0"/>
-          <a:ext cx="0" cy="0"/>
-          <a:chOff x="0" y="0"/>
-          <a:chExt cx="0" cy="0"/>
-        </a:xfrm>
-      </p:grpSpPr>
-      <p:pic>
-        <p:nvPicPr>
-          <p:cNvPr id="5" name="Picture 4" descr="A close up of text on a white background&#10;&#10;Description automatically generated">
-            <a:extLst>
-              <a:ext uri="{FF2B5EF4-FFF2-40B4-BE49-F238E27FC236}">
-                <a16:creationId xmlns:a16="http://schemas.microsoft.com/office/drawing/2014/main" id="{03EAAB8C-9476-CA4D-848D-417C7DB0DBB2}"/>
-              </a:ext>
-            </a:extLst>
-          </p:cNvPr>
-          <p:cNvPicPr>
-            <a:picLocks noChangeAspect="1"/>
-          </p:cNvPicPr>
-          <p:nvPr/>
-        </p:nvPicPr>
-        <p:blipFill>
-          <a:blip r:embed="rId2"/>
-          <a:stretch>
-            <a:fillRect/>
-          </a:stretch>
-        </p:blipFill>
-        <p:spPr>
-          <a:xfrm>
-            <a:off x="3113239" y="0"/>
-            <a:ext cx="5965521" cy="6858000"/>
+            <a:off x="3175169" y="0"/>
+            <a:ext cx="5841660" cy="6858000"/>
           </a:xfrm>
           <a:prstGeom prst="rect">
             <a:avLst/>
@@ -4938,7 +4112,7 @@
           <a:p>
             <a:r>
               <a:rPr lang="en-US" dirty="0"/>
-              <a:t>Step 3: PCA on executive functioning battery</a:t>
+              <a:t>Step 3: created executive function scores</a:t>
             </a:r>
           </a:p>
         </p:txBody>
@@ -4966,13 +4140,40 @@
           <a:p>
             <a:r>
               <a:rPr lang="en-US" dirty="0"/>
-              <a:t>Ran PCA on PENN-CPU executive functioning battery (n=742)</a:t>
+              <a:t>Used a-priori theory to create executive function, episodic memory, and social cognition scores</a:t>
             </a:r>
           </a:p>
           <a:p>
             <a:r>
               <a:rPr lang="en-US" dirty="0"/>
-              <a:t>Ended up with 3 components</a:t>
+              <a:t>Created efficiency scores by summing z-scored accuracy and inverse reaction time for correct trials</a:t>
+            </a:r>
+          </a:p>
+          <a:p>
+            <a:r>
+              <a:rPr lang="en-US" dirty="0"/>
+              <a:t>Summed z-scores across tasks to form composite scores:</a:t>
+            </a:r>
+          </a:p>
+          <a:p>
+            <a:pPr lvl="1"/>
+            <a:r>
+              <a:rPr lang="en-US" dirty="0"/>
+              <a:t>EF = conditional exclusion + continuous performance + letter-n-back + logical reasoning test</a:t>
+            </a:r>
+          </a:p>
+          <a:p>
+            <a:pPr lvl="1"/>
+            <a:r>
+              <a:rPr lang="en-US" dirty="0"/>
+              <a:t>EM = word memory test + face memory test + visual object learning test</a:t>
+            </a:r>
+          </a:p>
+          <a:p>
+            <a:pPr lvl="1"/>
+            <a:r>
+              <a:rPr lang="en-US" dirty="0"/>
+              <a:t>SC = emotion recognition + measured emotion differentiation</a:t>
             </a:r>
           </a:p>
         </p:txBody>
@@ -5007,40 +4208,72 @@
           <a:chExt cx="0" cy="0"/>
         </a:xfrm>
       </p:grpSpPr>
-      <p:pic>
-        <p:nvPicPr>
-          <p:cNvPr id="5" name="Picture 4" descr="A screenshot of a cell phone&#10;&#10;Description automatically generated">
-            <a:extLst>
-              <a:ext uri="{FF2B5EF4-FFF2-40B4-BE49-F238E27FC236}">
-                <a16:creationId xmlns:a16="http://schemas.microsoft.com/office/drawing/2014/main" id="{2B52E3BB-E6C9-E44E-9B20-A4B78EE73B29}"/>
-              </a:ext>
-            </a:extLst>
-          </p:cNvPr>
-          <p:cNvPicPr>
-            <a:picLocks noChangeAspect="1"/>
-          </p:cNvPicPr>
-          <p:nvPr/>
-        </p:nvPicPr>
-        <p:blipFill>
-          <a:blip r:embed="rId2"/>
-          <a:stretch>
-            <a:fillRect/>
-          </a:stretch>
-        </p:blipFill>
-        <p:spPr>
-          <a:xfrm>
-            <a:off x="628258" y="1500981"/>
-            <a:ext cx="10935483" cy="3856038"/>
-          </a:xfrm>
-          <a:prstGeom prst="rect">
-            <a:avLst/>
-          </a:prstGeom>
-        </p:spPr>
-      </p:pic>
+      <p:sp>
+        <p:nvSpPr>
+          <p:cNvPr id="2" name="Title 1">
+            <a:extLst>
+              <a:ext uri="{FF2B5EF4-FFF2-40B4-BE49-F238E27FC236}">
+                <a16:creationId xmlns:a16="http://schemas.microsoft.com/office/drawing/2014/main" id="{4891F36C-9926-0A47-8EA9-2E14D4310473}"/>
+              </a:ext>
+            </a:extLst>
+          </p:cNvPr>
+          <p:cNvSpPr>
+            <a:spLocks noGrp="1"/>
+          </p:cNvSpPr>
+          <p:nvPr>
+            <p:ph type="title"/>
+          </p:nvPr>
+        </p:nvSpPr>
+        <p:spPr/>
+        <p:txBody>
+          <a:bodyPr/>
+          <a:lstStyle/>
+          <a:p>
+            <a:r>
+              <a:rPr lang="en-US" dirty="0"/>
+              <a:t>Step 4: t-test between old and young adults</a:t>
+            </a:r>
+          </a:p>
+        </p:txBody>
+      </p:sp>
+      <p:sp>
+        <p:nvSpPr>
+          <p:cNvPr id="3" name="Content Placeholder 2">
+            <a:extLst>
+              <a:ext uri="{FF2B5EF4-FFF2-40B4-BE49-F238E27FC236}">
+                <a16:creationId xmlns:a16="http://schemas.microsoft.com/office/drawing/2014/main" id="{48A02207-8535-4D41-A650-5C1C982D2886}"/>
+              </a:ext>
+            </a:extLst>
+          </p:cNvPr>
+          <p:cNvSpPr>
+            <a:spLocks noGrp="1"/>
+          </p:cNvSpPr>
+          <p:nvPr>
+            <p:ph idx="1"/>
+          </p:nvPr>
+        </p:nvSpPr>
+        <p:spPr/>
+        <p:txBody>
+          <a:bodyPr/>
+          <a:lstStyle/>
+          <a:p>
+            <a:r>
+              <a:rPr lang="en-US" dirty="0"/>
+              <a:t>Ran independent t-tests to understand if different aspects of executive functioning differed between old (n=112) and young (n=169) participants</a:t>
+            </a:r>
+          </a:p>
+          <a:p>
+            <a:r>
+              <a:rPr lang="en-US" dirty="0"/>
+              <a:t>All three significantly declined with age</a:t>
+            </a:r>
+          </a:p>
+        </p:txBody>
+      </p:sp>
     </p:spTree>
     <p:extLst>
       <p:ext uri="{BB962C8B-B14F-4D97-AF65-F5344CB8AC3E}">
-        <p14:creationId xmlns:p14="http://schemas.microsoft.com/office/powerpoint/2010/main" val="2770865495"/>
+        <p14:creationId xmlns:p14="http://schemas.microsoft.com/office/powerpoint/2010/main" val="3931142717"/>
       </p:ext>
     </p:extLst>
   </p:cSld>
@@ -5067,98 +4300,277 @@
           <a:chExt cx="0" cy="0"/>
         </a:xfrm>
       </p:grpSpPr>
-      <p:sp>
-        <p:nvSpPr>
-          <p:cNvPr id="2" name="Title 1">
-            <a:extLst>
-              <a:ext uri="{FF2B5EF4-FFF2-40B4-BE49-F238E27FC236}">
-                <a16:creationId xmlns:a16="http://schemas.microsoft.com/office/drawing/2014/main" id="{4891F36C-9926-0A47-8EA9-2E14D4310473}"/>
-              </a:ext>
-            </a:extLst>
-          </p:cNvPr>
-          <p:cNvSpPr>
-            <a:spLocks noGrp="1"/>
-          </p:cNvSpPr>
-          <p:nvPr>
-            <p:ph type="title"/>
-          </p:nvPr>
-        </p:nvSpPr>
-        <p:spPr/>
-        <p:txBody>
-          <a:bodyPr/>
+      <p:pic>
+        <p:nvPicPr>
+          <p:cNvPr id="9" name="Picture 8">
+            <a:extLst>
+              <a:ext uri="{FF2B5EF4-FFF2-40B4-BE49-F238E27FC236}">
+                <a16:creationId xmlns:a16="http://schemas.microsoft.com/office/drawing/2014/main" id="{C9172F1C-9A9C-5B49-80FF-A6047F77C2B1}"/>
+              </a:ext>
+            </a:extLst>
+          </p:cNvPr>
+          <p:cNvPicPr>
+            <a:picLocks noChangeAspect="1"/>
+          </p:cNvPicPr>
+          <p:nvPr/>
+        </p:nvPicPr>
+        <p:blipFill rotWithShape="1">
+          <a:blip r:embed="rId2"/>
+          <a:srcRect t="6056"/>
+          <a:stretch/>
+        </p:blipFill>
+        <p:spPr>
+          <a:xfrm>
+            <a:off x="1580650" y="1129025"/>
+            <a:ext cx="8339977" cy="5728975"/>
+          </a:xfrm>
+          <a:prstGeom prst="rect">
+            <a:avLst/>
+          </a:prstGeom>
+        </p:spPr>
+      </p:pic>
+      <p:sp>
+        <p:nvSpPr>
+          <p:cNvPr id="6" name="Left Bracket 5">
+            <a:extLst>
+              <a:ext uri="{FF2B5EF4-FFF2-40B4-BE49-F238E27FC236}">
+                <a16:creationId xmlns:a16="http://schemas.microsoft.com/office/drawing/2014/main" id="{EABA0BDA-C028-C543-82AA-201A24938989}"/>
+              </a:ext>
+            </a:extLst>
+          </p:cNvPr>
+          <p:cNvSpPr/>
+          <p:nvPr/>
+        </p:nvSpPr>
+        <p:spPr>
+          <a:xfrm rot="5400000">
+            <a:off x="5621981" y="791780"/>
+            <a:ext cx="352720" cy="776288"/>
+          </a:xfrm>
+          <a:prstGeom prst="leftBracket">
+            <a:avLst>
+              <a:gd name="adj" fmla="val 20991"/>
+            </a:avLst>
+          </a:prstGeom>
+          <a:ln w="38100"/>
+        </p:spPr>
+        <p:style>
+          <a:lnRef idx="1">
+            <a:schemeClr val="dk1"/>
+          </a:lnRef>
+          <a:fillRef idx="0">
+            <a:schemeClr val="dk1"/>
+          </a:fillRef>
+          <a:effectRef idx="0">
+            <a:schemeClr val="dk1"/>
+          </a:effectRef>
+          <a:fontRef idx="minor">
+            <a:schemeClr val="tx1"/>
+          </a:fontRef>
+        </p:style>
+        <p:txBody>
+          <a:bodyPr rtlCol="0" anchor="ctr"/>
+          <a:lstStyle/>
+          <a:p>
+            <a:pPr algn="ctr"/>
+            <a:endParaRPr lang="en-US"/>
+          </a:p>
+        </p:txBody>
+      </p:sp>
+      <p:sp>
+        <p:nvSpPr>
+          <p:cNvPr id="7" name="TextBox 6">
+            <a:extLst>
+              <a:ext uri="{FF2B5EF4-FFF2-40B4-BE49-F238E27FC236}">
+                <a16:creationId xmlns:a16="http://schemas.microsoft.com/office/drawing/2014/main" id="{E54EA5EC-4065-CF47-A401-2FA7676A9312}"/>
+              </a:ext>
+            </a:extLst>
+          </p:cNvPr>
+          <p:cNvSpPr txBox="1"/>
+          <p:nvPr/>
+        </p:nvSpPr>
+        <p:spPr>
+          <a:xfrm>
+            <a:off x="5532117" y="727631"/>
+            <a:ext cx="670560" cy="369332"/>
+          </a:xfrm>
+          <a:prstGeom prst="rect">
+            <a:avLst/>
+          </a:prstGeom>
+          <a:noFill/>
+        </p:spPr>
+        <p:txBody>
+          <a:bodyPr wrap="square" rtlCol="0">
+            <a:spAutoFit/>
+          </a:bodyPr>
           <a:lstStyle/>
           <a:p>
             <a:r>
               <a:rPr lang="en-US" dirty="0"/>
-              <a:t>Step 4: t-test between old and young adults</a:t>
-            </a:r>
-          </a:p>
-        </p:txBody>
-      </p:sp>
-      <p:sp>
-        <p:nvSpPr>
-          <p:cNvPr id="3" name="Content Placeholder 2">
-            <a:extLst>
-              <a:ext uri="{FF2B5EF4-FFF2-40B4-BE49-F238E27FC236}">
-                <a16:creationId xmlns:a16="http://schemas.microsoft.com/office/drawing/2014/main" id="{48A02207-8535-4D41-A650-5C1C982D2886}"/>
-              </a:ext>
-            </a:extLst>
-          </p:cNvPr>
-          <p:cNvSpPr>
-            <a:spLocks noGrp="1"/>
-          </p:cNvSpPr>
-          <p:nvPr>
-            <p:ph idx="1"/>
-          </p:nvPr>
-        </p:nvSpPr>
-        <p:spPr/>
-        <p:txBody>
-          <a:bodyPr/>
+              <a:t>***</a:t>
+            </a:r>
+          </a:p>
+        </p:txBody>
+      </p:sp>
+      <p:sp>
+        <p:nvSpPr>
+          <p:cNvPr id="10" name="Left Bracket 9">
+            <a:extLst>
+              <a:ext uri="{FF2B5EF4-FFF2-40B4-BE49-F238E27FC236}">
+                <a16:creationId xmlns:a16="http://schemas.microsoft.com/office/drawing/2014/main" id="{958E7BA6-C4D9-A04B-B5D5-FE1ADBA9910A}"/>
+              </a:ext>
+            </a:extLst>
+          </p:cNvPr>
+          <p:cNvSpPr/>
+          <p:nvPr/>
+        </p:nvSpPr>
+        <p:spPr>
+          <a:xfrm rot="5400000">
+            <a:off x="7874644" y="791780"/>
+            <a:ext cx="352720" cy="776288"/>
+          </a:xfrm>
+          <a:prstGeom prst="leftBracket">
+            <a:avLst>
+              <a:gd name="adj" fmla="val 20991"/>
+            </a:avLst>
+          </a:prstGeom>
+          <a:ln w="38100"/>
+        </p:spPr>
+        <p:style>
+          <a:lnRef idx="1">
+            <a:schemeClr val="dk1"/>
+          </a:lnRef>
+          <a:fillRef idx="0">
+            <a:schemeClr val="dk1"/>
+          </a:fillRef>
+          <a:effectRef idx="0">
+            <a:schemeClr val="dk1"/>
+          </a:effectRef>
+          <a:fontRef idx="minor">
+            <a:schemeClr val="tx1"/>
+          </a:fontRef>
+        </p:style>
+        <p:txBody>
+          <a:bodyPr rtlCol="0" anchor="ctr"/>
+          <a:lstStyle/>
+          <a:p>
+            <a:pPr algn="ctr"/>
+            <a:endParaRPr lang="en-US"/>
+          </a:p>
+        </p:txBody>
+      </p:sp>
+      <p:sp>
+        <p:nvSpPr>
+          <p:cNvPr id="11" name="TextBox 10">
+            <a:extLst>
+              <a:ext uri="{FF2B5EF4-FFF2-40B4-BE49-F238E27FC236}">
+                <a16:creationId xmlns:a16="http://schemas.microsoft.com/office/drawing/2014/main" id="{0FA3BEEB-4DF4-FD4E-B1CC-13B7D0AB1237}"/>
+              </a:ext>
+            </a:extLst>
+          </p:cNvPr>
+          <p:cNvSpPr txBox="1"/>
+          <p:nvPr/>
+        </p:nvSpPr>
+        <p:spPr>
+          <a:xfrm>
+            <a:off x="7755053" y="727631"/>
+            <a:ext cx="670560" cy="369332"/>
+          </a:xfrm>
+          <a:prstGeom prst="rect">
+            <a:avLst/>
+          </a:prstGeom>
+          <a:noFill/>
+        </p:spPr>
+        <p:txBody>
+          <a:bodyPr wrap="square" rtlCol="0">
+            <a:spAutoFit/>
+          </a:bodyPr>
           <a:lstStyle/>
           <a:p>
             <a:r>
               <a:rPr lang="en-US" dirty="0"/>
-              <a:t>Ran independent t-tests to understand if different aspects of executive functioning differed between old (n=152) and young (n=207) participants</a:t>
-            </a:r>
-          </a:p>
+              <a:t>***</a:t>
+            </a:r>
+          </a:p>
+        </p:txBody>
+      </p:sp>
+      <p:sp>
+        <p:nvSpPr>
+          <p:cNvPr id="12" name="Left Bracket 11">
+            <a:extLst>
+              <a:ext uri="{FF2B5EF4-FFF2-40B4-BE49-F238E27FC236}">
+                <a16:creationId xmlns:a16="http://schemas.microsoft.com/office/drawing/2014/main" id="{76E0A4AF-7F0F-884B-8C5A-7406681E8015}"/>
+              </a:ext>
+            </a:extLst>
+          </p:cNvPr>
+          <p:cNvSpPr/>
+          <p:nvPr/>
+        </p:nvSpPr>
+        <p:spPr>
+          <a:xfrm rot="5400000">
+            <a:off x="3321688" y="791780"/>
+            <a:ext cx="352720" cy="776288"/>
+          </a:xfrm>
+          <a:prstGeom prst="leftBracket">
+            <a:avLst>
+              <a:gd name="adj" fmla="val 20991"/>
+            </a:avLst>
+          </a:prstGeom>
+          <a:ln w="38100"/>
+        </p:spPr>
+        <p:style>
+          <a:lnRef idx="1">
+            <a:schemeClr val="dk1"/>
+          </a:lnRef>
+          <a:fillRef idx="0">
+            <a:schemeClr val="dk1"/>
+          </a:fillRef>
+          <a:effectRef idx="0">
+            <a:schemeClr val="dk1"/>
+          </a:effectRef>
+          <a:fontRef idx="minor">
+            <a:schemeClr val="tx1"/>
+          </a:fontRef>
+        </p:style>
+        <p:txBody>
+          <a:bodyPr rtlCol="0" anchor="ctr"/>
+          <a:lstStyle/>
+          <a:p>
+            <a:pPr algn="ctr"/>
+            <a:endParaRPr lang="en-US"/>
+          </a:p>
+        </p:txBody>
+      </p:sp>
+      <p:sp>
+        <p:nvSpPr>
+          <p:cNvPr id="13" name="TextBox 12">
+            <a:extLst>
+              <a:ext uri="{FF2B5EF4-FFF2-40B4-BE49-F238E27FC236}">
+                <a16:creationId xmlns:a16="http://schemas.microsoft.com/office/drawing/2014/main" id="{97CDA1D1-B784-E046-85E7-FD967D3E52CF}"/>
+              </a:ext>
+            </a:extLst>
+          </p:cNvPr>
+          <p:cNvSpPr txBox="1"/>
+          <p:nvPr/>
+        </p:nvSpPr>
+        <p:spPr>
+          <a:xfrm>
+            <a:off x="3189644" y="725797"/>
+            <a:ext cx="670560" cy="369332"/>
+          </a:xfrm>
+          <a:prstGeom prst="rect">
+            <a:avLst/>
+          </a:prstGeom>
+          <a:noFill/>
+        </p:spPr>
+        <p:txBody>
+          <a:bodyPr wrap="square" rtlCol="0">
+            <a:spAutoFit/>
+          </a:bodyPr>
+          <a:lstStyle/>
           <a:p>
             <a:r>
               <a:rPr lang="en-US" dirty="0"/>
-              <a:t>Components 1 greater in old adults</a:t>
-            </a:r>
-          </a:p>
-          <a:p>
-            <a:pPr lvl="1"/>
-            <a:r>
-              <a:rPr lang="en-US" dirty="0"/>
-              <a:t>Verbal abilities and face memory</a:t>
-            </a:r>
-          </a:p>
-          <a:p>
-            <a:pPr lvl="1"/>
-            <a:r>
-              <a:rPr lang="en-US" dirty="0"/>
-              <a:t>(Not significant if including SES and gender)</a:t>
-            </a:r>
-          </a:p>
-          <a:p>
-            <a:r>
-              <a:rPr lang="en-US" dirty="0"/>
-              <a:t>Components 2 and 3 greater in young adults</a:t>
-            </a:r>
-          </a:p>
-          <a:p>
-            <a:pPr lvl="1"/>
-            <a:r>
-              <a:rPr lang="en-US" dirty="0"/>
-              <a:t>Motor skills, mental flexibility, and object memory</a:t>
-            </a:r>
-          </a:p>
-          <a:p>
-            <a:pPr lvl="1"/>
-            <a:r>
-              <a:rPr lang="en-US" dirty="0"/>
-              <a:t>Vigilance and working memory</a:t>
+              <a:t>***</a:t>
             </a:r>
           </a:p>
         </p:txBody>
@@ -5166,7 +4578,7 @@
     </p:spTree>
     <p:extLst>
       <p:ext uri="{BB962C8B-B14F-4D97-AF65-F5344CB8AC3E}">
-        <p14:creationId xmlns:p14="http://schemas.microsoft.com/office/powerpoint/2010/main" val="3931142717"/>
+        <p14:creationId xmlns:p14="http://schemas.microsoft.com/office/powerpoint/2010/main" val="2567580217"/>
       </p:ext>
     </p:extLst>
   </p:cSld>
@@ -5193,278 +4605,64 @@
           <a:chExt cx="0" cy="0"/>
         </a:xfrm>
       </p:grpSpPr>
-      <p:pic>
-        <p:nvPicPr>
-          <p:cNvPr id="9" name="Picture 8" descr="A screenshot of a cell phone&#10;&#10;Description automatically generated">
-            <a:extLst>
-              <a:ext uri="{FF2B5EF4-FFF2-40B4-BE49-F238E27FC236}">
-                <a16:creationId xmlns:a16="http://schemas.microsoft.com/office/drawing/2014/main" id="{C9172F1C-9A9C-5B49-80FF-A6047F77C2B1}"/>
-              </a:ext>
-            </a:extLst>
-          </p:cNvPr>
-          <p:cNvPicPr>
-            <a:picLocks noChangeAspect="1"/>
-          </p:cNvPicPr>
-          <p:nvPr/>
-        </p:nvPicPr>
-        <p:blipFill>
-          <a:blip r:embed="rId2"/>
-          <a:stretch>
-            <a:fillRect/>
-          </a:stretch>
-        </p:blipFill>
-        <p:spPr>
-          <a:xfrm>
-            <a:off x="857250" y="727631"/>
-            <a:ext cx="10115550" cy="6098307"/>
-          </a:xfrm>
-          <a:prstGeom prst="rect">
-            <a:avLst/>
-          </a:prstGeom>
-        </p:spPr>
-      </p:pic>
-      <p:sp>
-        <p:nvSpPr>
-          <p:cNvPr id="6" name="Left Bracket 5">
-            <a:extLst>
-              <a:ext uri="{FF2B5EF4-FFF2-40B4-BE49-F238E27FC236}">
-                <a16:creationId xmlns:a16="http://schemas.microsoft.com/office/drawing/2014/main" id="{EABA0BDA-C028-C543-82AA-201A24938989}"/>
-              </a:ext>
-            </a:extLst>
-          </p:cNvPr>
-          <p:cNvSpPr/>
-          <p:nvPr/>
-        </p:nvSpPr>
-        <p:spPr>
-          <a:xfrm rot="5400000">
-            <a:off x="5621981" y="791780"/>
-            <a:ext cx="352720" cy="776288"/>
-          </a:xfrm>
-          <a:prstGeom prst="leftBracket">
-            <a:avLst>
-              <a:gd name="adj" fmla="val 20991"/>
-            </a:avLst>
-          </a:prstGeom>
-          <a:ln w="38100"/>
-        </p:spPr>
-        <p:style>
-          <a:lnRef idx="1">
-            <a:schemeClr val="dk1"/>
-          </a:lnRef>
-          <a:fillRef idx="0">
-            <a:schemeClr val="dk1"/>
-          </a:fillRef>
-          <a:effectRef idx="0">
-            <a:schemeClr val="dk1"/>
-          </a:effectRef>
-          <a:fontRef idx="minor">
-            <a:schemeClr val="tx1"/>
-          </a:fontRef>
-        </p:style>
-        <p:txBody>
-          <a:bodyPr rtlCol="0" anchor="ctr"/>
-          <a:lstStyle/>
-          <a:p>
-            <a:pPr algn="ctr"/>
-            <a:endParaRPr lang="en-US"/>
-          </a:p>
-        </p:txBody>
-      </p:sp>
-      <p:sp>
-        <p:nvSpPr>
-          <p:cNvPr id="7" name="TextBox 6">
-            <a:extLst>
-              <a:ext uri="{FF2B5EF4-FFF2-40B4-BE49-F238E27FC236}">
-                <a16:creationId xmlns:a16="http://schemas.microsoft.com/office/drawing/2014/main" id="{E54EA5EC-4065-CF47-A401-2FA7676A9312}"/>
-              </a:ext>
-            </a:extLst>
-          </p:cNvPr>
-          <p:cNvSpPr txBox="1"/>
-          <p:nvPr/>
-        </p:nvSpPr>
-        <p:spPr>
-          <a:xfrm>
-            <a:off x="5532117" y="727631"/>
-            <a:ext cx="670560" cy="369332"/>
-          </a:xfrm>
-          <a:prstGeom prst="rect">
-            <a:avLst/>
-          </a:prstGeom>
-          <a:noFill/>
-        </p:spPr>
-        <p:txBody>
-          <a:bodyPr wrap="square" rtlCol="0">
-            <a:spAutoFit/>
-          </a:bodyPr>
+      <p:sp>
+        <p:nvSpPr>
+          <p:cNvPr id="2" name="Title 1">
+            <a:extLst>
+              <a:ext uri="{FF2B5EF4-FFF2-40B4-BE49-F238E27FC236}">
+                <a16:creationId xmlns:a16="http://schemas.microsoft.com/office/drawing/2014/main" id="{C0CDD26D-59AB-F944-AA52-CA121FA51D0D}"/>
+              </a:ext>
+            </a:extLst>
+          </p:cNvPr>
+          <p:cNvSpPr>
+            <a:spLocks noGrp="1"/>
+          </p:cNvSpPr>
+          <p:nvPr>
+            <p:ph type="title"/>
+          </p:nvPr>
+        </p:nvSpPr>
+        <p:spPr/>
+        <p:txBody>
+          <a:bodyPr/>
           <a:lstStyle/>
           <a:p>
             <a:r>
               <a:rPr lang="en-US" dirty="0"/>
-              <a:t>***</a:t>
-            </a:r>
-          </a:p>
-        </p:txBody>
-      </p:sp>
-      <p:sp>
-        <p:nvSpPr>
-          <p:cNvPr id="10" name="Left Bracket 9">
-            <a:extLst>
-              <a:ext uri="{FF2B5EF4-FFF2-40B4-BE49-F238E27FC236}">
-                <a16:creationId xmlns:a16="http://schemas.microsoft.com/office/drawing/2014/main" id="{958E7BA6-C4D9-A04B-B5D5-FE1ADBA9910A}"/>
-              </a:ext>
-            </a:extLst>
-          </p:cNvPr>
-          <p:cNvSpPr/>
-          <p:nvPr/>
-        </p:nvSpPr>
-        <p:spPr>
-          <a:xfrm rot="5400000">
-            <a:off x="7874644" y="791780"/>
-            <a:ext cx="352720" cy="776288"/>
-          </a:xfrm>
-          <a:prstGeom prst="leftBracket">
-            <a:avLst>
-              <a:gd name="adj" fmla="val 20991"/>
-            </a:avLst>
-          </a:prstGeom>
-          <a:ln w="38100"/>
-        </p:spPr>
-        <p:style>
-          <a:lnRef idx="1">
-            <a:schemeClr val="dk1"/>
-          </a:lnRef>
-          <a:fillRef idx="0">
-            <a:schemeClr val="dk1"/>
-          </a:fillRef>
-          <a:effectRef idx="0">
-            <a:schemeClr val="dk1"/>
-          </a:effectRef>
-          <a:fontRef idx="minor">
-            <a:schemeClr val="tx1"/>
-          </a:fontRef>
-        </p:style>
-        <p:txBody>
-          <a:bodyPr rtlCol="0" anchor="ctr"/>
-          <a:lstStyle/>
-          <a:p>
-            <a:pPr algn="ctr"/>
-            <a:endParaRPr lang="en-US"/>
-          </a:p>
-        </p:txBody>
-      </p:sp>
-      <p:sp>
-        <p:nvSpPr>
-          <p:cNvPr id="11" name="TextBox 10">
-            <a:extLst>
-              <a:ext uri="{FF2B5EF4-FFF2-40B4-BE49-F238E27FC236}">
-                <a16:creationId xmlns:a16="http://schemas.microsoft.com/office/drawing/2014/main" id="{0FA3BEEB-4DF4-FD4E-B1CC-13B7D0AB1237}"/>
-              </a:ext>
-            </a:extLst>
-          </p:cNvPr>
-          <p:cNvSpPr txBox="1"/>
-          <p:nvPr/>
-        </p:nvSpPr>
-        <p:spPr>
-          <a:xfrm>
-            <a:off x="7856219" y="727631"/>
-            <a:ext cx="670560" cy="369332"/>
-          </a:xfrm>
-          <a:prstGeom prst="rect">
-            <a:avLst/>
-          </a:prstGeom>
-          <a:noFill/>
-        </p:spPr>
-        <p:txBody>
-          <a:bodyPr wrap="square" rtlCol="0">
-            <a:spAutoFit/>
-          </a:bodyPr>
+              <a:t>Step 5: multivariate analysis</a:t>
+            </a:r>
+          </a:p>
+        </p:txBody>
+      </p:sp>
+      <p:sp>
+        <p:nvSpPr>
+          <p:cNvPr id="3" name="Content Placeholder 2">
+            <a:extLst>
+              <a:ext uri="{FF2B5EF4-FFF2-40B4-BE49-F238E27FC236}">
+                <a16:creationId xmlns:a16="http://schemas.microsoft.com/office/drawing/2014/main" id="{2A5F543B-0306-B541-89D1-E16C08A2F2E9}"/>
+              </a:ext>
+            </a:extLst>
+          </p:cNvPr>
+          <p:cNvSpPr>
+            <a:spLocks noGrp="1"/>
+          </p:cNvSpPr>
+          <p:nvPr>
+            <p:ph idx="1"/>
+          </p:nvPr>
+        </p:nvSpPr>
+        <p:spPr/>
+        <p:txBody>
+          <a:bodyPr/>
           <a:lstStyle/>
           <a:p>
             <a:r>
               <a:rPr lang="en-US" dirty="0"/>
-              <a:t>**</a:t>
-            </a:r>
-          </a:p>
-        </p:txBody>
-      </p:sp>
-      <p:sp>
-        <p:nvSpPr>
-          <p:cNvPr id="12" name="Left Bracket 11">
-            <a:extLst>
-              <a:ext uri="{FF2B5EF4-FFF2-40B4-BE49-F238E27FC236}">
-                <a16:creationId xmlns:a16="http://schemas.microsoft.com/office/drawing/2014/main" id="{76E0A4AF-7F0F-884B-8C5A-7406681E8015}"/>
-              </a:ext>
-            </a:extLst>
-          </p:cNvPr>
-          <p:cNvSpPr/>
-          <p:nvPr/>
-        </p:nvSpPr>
-        <p:spPr>
-          <a:xfrm rot="5400000">
-            <a:off x="3321688" y="791780"/>
-            <a:ext cx="352720" cy="776288"/>
-          </a:xfrm>
-          <a:prstGeom prst="leftBracket">
-            <a:avLst>
-              <a:gd name="adj" fmla="val 20991"/>
-            </a:avLst>
-          </a:prstGeom>
-          <a:ln w="38100"/>
-        </p:spPr>
-        <p:style>
-          <a:lnRef idx="1">
-            <a:schemeClr val="dk1"/>
-          </a:lnRef>
-          <a:fillRef idx="0">
-            <a:schemeClr val="dk1"/>
-          </a:fillRef>
-          <a:effectRef idx="0">
-            <a:schemeClr val="dk1"/>
-          </a:effectRef>
-          <a:fontRef idx="minor">
-            <a:schemeClr val="tx1"/>
-          </a:fontRef>
-        </p:style>
-        <p:txBody>
-          <a:bodyPr rtlCol="0" anchor="ctr"/>
-          <a:lstStyle/>
-          <a:p>
-            <a:pPr algn="ctr"/>
-            <a:endParaRPr lang="en-US"/>
-          </a:p>
-        </p:txBody>
-      </p:sp>
-      <p:sp>
-        <p:nvSpPr>
-          <p:cNvPr id="13" name="TextBox 12">
-            <a:extLst>
-              <a:ext uri="{FF2B5EF4-FFF2-40B4-BE49-F238E27FC236}">
-                <a16:creationId xmlns:a16="http://schemas.microsoft.com/office/drawing/2014/main" id="{97CDA1D1-B784-E046-85E7-FD967D3E52CF}"/>
-              </a:ext>
-            </a:extLst>
-          </p:cNvPr>
-          <p:cNvSpPr txBox="1"/>
-          <p:nvPr/>
-        </p:nvSpPr>
-        <p:spPr>
-          <a:xfrm>
-            <a:off x="3303263" y="727631"/>
-            <a:ext cx="670560" cy="369332"/>
-          </a:xfrm>
-          <a:prstGeom prst="rect">
-            <a:avLst/>
-          </a:prstGeom>
-          <a:noFill/>
-        </p:spPr>
-        <p:txBody>
-          <a:bodyPr wrap="square" rtlCol="0">
-            <a:spAutoFit/>
-          </a:bodyPr>
-          <a:lstStyle/>
+              <a:t>Assessing the relationship between the 7 components of thought and the 3 measures of cognition (n=167 young adults, n=112 old adults)</a:t>
+            </a:r>
+          </a:p>
           <a:p>
             <a:r>
               <a:rPr lang="en-US" dirty="0"/>
-              <a:t>**</a:t>
+              <a:t>Significant relationship between episodic memory and factor 7 (thinking in images)</a:t>
             </a:r>
           </a:p>
         </p:txBody>
@@ -5472,7 +4670,7 @@
     </p:spTree>
     <p:extLst>
       <p:ext uri="{BB962C8B-B14F-4D97-AF65-F5344CB8AC3E}">
-        <p14:creationId xmlns:p14="http://schemas.microsoft.com/office/powerpoint/2010/main" val="2567580217"/>
+        <p14:creationId xmlns:p14="http://schemas.microsoft.com/office/powerpoint/2010/main" val="1594755914"/>
       </p:ext>
     </p:extLst>
   </p:cSld>
@@ -5504,7 +4702,7 @@
           <p:cNvPr id="2" name="Title 1">
             <a:extLst>
               <a:ext uri="{FF2B5EF4-FFF2-40B4-BE49-F238E27FC236}">
-                <a16:creationId xmlns:a16="http://schemas.microsoft.com/office/drawing/2014/main" id="{C0CDD26D-59AB-F944-AA52-CA121FA51D0D}"/>
+                <a16:creationId xmlns:a16="http://schemas.microsoft.com/office/drawing/2014/main" id="{3849E5B2-EC9D-C84B-B07C-D45B304C79C0}"/>
               </a:ext>
             </a:extLst>
           </p:cNvPr>
@@ -5522,7 +4720,7 @@
           <a:p>
             <a:r>
               <a:rPr lang="en-US" dirty="0"/>
-              <a:t>Step 5: multivariate analysis</a:t>
+              <a:t>Noticed: age no longer significant</a:t>
             </a:r>
           </a:p>
         </p:txBody>
@@ -5532,7 +4730,7 @@
           <p:cNvPr id="3" name="Content Placeholder 2">
             <a:extLst>
               <a:ext uri="{FF2B5EF4-FFF2-40B4-BE49-F238E27FC236}">
-                <a16:creationId xmlns:a16="http://schemas.microsoft.com/office/drawing/2014/main" id="{2A5F543B-0306-B541-89D1-E16C08A2F2E9}"/>
+                <a16:creationId xmlns:a16="http://schemas.microsoft.com/office/drawing/2014/main" id="{371601AC-8E76-DA48-9FA3-294F6953F4F9}"/>
               </a:ext>
             </a:extLst>
           </p:cNvPr>
@@ -5550,37 +4748,21 @@
           <a:p>
             <a:r>
               <a:rPr lang="en-US" dirty="0"/>
-              <a:t>Assessing the relationship between the 7 components of thought and the 3 measures of EF, as well as interactions with age (n=162 young adults, n=119 old adults)</a:t>
+              <a:t>In this model, age no longer related to component 7 (thinking in images)</a:t>
             </a:r>
           </a:p>
           <a:p>
             <a:r>
               <a:rPr lang="en-US" dirty="0"/>
-              <a:t>Significant effect of component 2 of EF (motor skills, mental flexibility, and object memory)</a:t>
-            </a:r>
-          </a:p>
-          <a:p>
-            <a:r>
-              <a:rPr lang="en-US" dirty="0"/>
-              <a:t>Positive relationship to component 6 (disjointed and fragmented thinking) and component 7 (thinking in images)</a:t>
-            </a:r>
-          </a:p>
-          <a:p>
-            <a:pPr lvl="1"/>
-            <a:r>
-              <a:rPr lang="en-US" dirty="0"/>
-              <a:t>Interaction with age for component 6 (driven by younger adults)</a:t>
-            </a:r>
-          </a:p>
-          <a:p>
-            <a:endParaRPr lang="en-US" dirty="0"/>
+              <a:t>Potential mediation by episodic memory</a:t>
+            </a:r>
           </a:p>
         </p:txBody>
       </p:sp>
     </p:spTree>
     <p:extLst>
       <p:ext uri="{BB962C8B-B14F-4D97-AF65-F5344CB8AC3E}">
-        <p14:creationId xmlns:p14="http://schemas.microsoft.com/office/powerpoint/2010/main" val="1594755914"/>
+        <p14:creationId xmlns:p14="http://schemas.microsoft.com/office/powerpoint/2010/main" val="1873381221"/>
       </p:ext>
     </p:extLst>
   </p:cSld>

</xml_diff>